<commit_message>
add intro and ending slides to powerpoint, include embarrassing code and plotting examples.
</commit_message>
<xml_diff>
--- a/class_3_4.pptx
+++ b/class_3_4.pptx
@@ -5,7 +5,7 @@
     <p:sldMasterId id="2147483648" r:id="rId1"/>
   </p:sldMasterIdLst>
   <p:notesMasterIdLst>
-    <p:notesMasterId r:id="rId27"/>
+    <p:notesMasterId r:id="rId29"/>
   </p:notesMasterIdLst>
   <p:sldIdLst>
     <p:sldId id="256" r:id="rId2"/>
@@ -21,18 +21,20 @@
     <p:sldId id="268" r:id="rId12"/>
     <p:sldId id="269" r:id="rId13"/>
     <p:sldId id="270" r:id="rId14"/>
-    <p:sldId id="271" r:id="rId15"/>
-    <p:sldId id="274" r:id="rId16"/>
-    <p:sldId id="284" r:id="rId17"/>
-    <p:sldId id="280" r:id="rId18"/>
-    <p:sldId id="285" r:id="rId19"/>
-    <p:sldId id="281" r:id="rId20"/>
-    <p:sldId id="289" r:id="rId21"/>
-    <p:sldId id="287" r:id="rId22"/>
-    <p:sldId id="288" r:id="rId23"/>
-    <p:sldId id="290" r:id="rId24"/>
-    <p:sldId id="282" r:id="rId25"/>
-    <p:sldId id="283" r:id="rId26"/>
+    <p:sldId id="292" r:id="rId15"/>
+    <p:sldId id="271" r:id="rId16"/>
+    <p:sldId id="274" r:id="rId17"/>
+    <p:sldId id="284" r:id="rId18"/>
+    <p:sldId id="280" r:id="rId19"/>
+    <p:sldId id="285" r:id="rId20"/>
+    <p:sldId id="281" r:id="rId21"/>
+    <p:sldId id="289" r:id="rId22"/>
+    <p:sldId id="287" r:id="rId23"/>
+    <p:sldId id="288" r:id="rId24"/>
+    <p:sldId id="290" r:id="rId25"/>
+    <p:sldId id="282" r:id="rId26"/>
+    <p:sldId id="283" r:id="rId27"/>
+    <p:sldId id="291" r:id="rId28"/>
   </p:sldIdLst>
   <p:sldSz cx="12192000" cy="6858000"/>
   <p:notesSz cx="6858000" cy="9144000"/>
@@ -906,11 +908,11 @@
           <c:showPercent val="0"/>
           <c:showBubbleSize val="0"/>
         </c:dLbls>
-        <c:axId val="-1171160992"/>
-        <c:axId val="-1171159904"/>
+        <c:axId val="-1424680032"/>
+        <c:axId val="-1212337728"/>
       </c:scatterChart>
       <c:valAx>
-        <c:axId val="-1171160992"/>
+        <c:axId val="-1424680032"/>
         <c:scaling>
           <c:orientation val="minMax"/>
         </c:scaling>
@@ -967,12 +969,12 @@
             <a:endParaRPr lang="en-US"/>
           </a:p>
         </c:txPr>
-        <c:crossAx val="-1171159904"/>
+        <c:crossAx val="-1212337728"/>
         <c:crosses val="autoZero"/>
         <c:crossBetween val="midCat"/>
       </c:valAx>
       <c:valAx>
-        <c:axId val="-1171159904"/>
+        <c:axId val="-1212337728"/>
         <c:scaling>
           <c:orientation val="minMax"/>
         </c:scaling>
@@ -1029,7 +1031,7 @@
             <a:endParaRPr lang="en-US"/>
           </a:p>
         </c:txPr>
-        <c:crossAx val="-1171160992"/>
+        <c:crossAx val="-1424680032"/>
         <c:crosses val="autoZero"/>
         <c:crossBetween val="midCat"/>
       </c:valAx>
@@ -2056,8 +2058,128 @@
             </a:r>
             <a:r>
               <a:rPr lang="en-US" baseline="0" dirty="0" smtClean="0"/>
-              <a:t> who I am, my background, my job, my work interests</a:t>
+              <a:t> who I am, my </a:t>
             </a:r>
+            <a:r>
+              <a:rPr lang="en-US" baseline="0" dirty="0" smtClean="0"/>
+              <a:t>interests, background, current role</a:t>
+            </a:r>
+          </a:p>
+          <a:p>
+            <a:r>
+              <a:rPr lang="en-US" baseline="0" dirty="0" smtClean="0"/>
+              <a:t>--</a:t>
+            </a:r>
+            <a:r>
+              <a:rPr lang="en-US" baseline="0" dirty="0" err="1" smtClean="0"/>
+              <a:t>nyu</a:t>
+            </a:r>
+            <a:r>
+              <a:rPr lang="en-US" baseline="0" dirty="0" smtClean="0"/>
+              <a:t>, bio/math, MATLAB, public health, data </a:t>
+            </a:r>
+            <a:r>
+              <a:rPr lang="en-US" baseline="0" dirty="0" err="1" smtClean="0"/>
+              <a:t>viz</a:t>
+            </a:r>
+            <a:endParaRPr lang="en-US" baseline="0" dirty="0" smtClean="0"/>
+          </a:p>
+          <a:p>
+            <a:endParaRPr lang="en-US" baseline="0" dirty="0" smtClean="0"/>
+          </a:p>
+          <a:p>
+            <a:r>
+              <a:rPr lang="en-US" baseline="0" dirty="0" smtClean="0"/>
+              <a:t>Projects:</a:t>
+            </a:r>
+          </a:p>
+          <a:p>
+            <a:r>
+              <a:rPr lang="en-US" sz="1200" kern="1200" dirty="0" smtClean="0">
+                <a:solidFill>
+                  <a:schemeClr val="tx1"/>
+                </a:solidFill>
+                <a:effectLst/>
+                <a:latin typeface="+mn-lt"/>
+                <a:ea typeface="+mn-ea"/>
+                <a:cs typeface="+mn-cs"/>
+              </a:rPr>
+              <a:t>What is the research question? </a:t>
+            </a:r>
+          </a:p>
+          <a:p>
+            <a:r>
+              <a:rPr lang="en-US" sz="1200" kern="1200" dirty="0" smtClean="0">
+                <a:solidFill>
+                  <a:schemeClr val="tx1"/>
+                </a:solidFill>
+                <a:effectLst/>
+                <a:latin typeface="+mn-lt"/>
+                <a:ea typeface="+mn-ea"/>
+                <a:cs typeface="+mn-cs"/>
+              </a:rPr>
+              <a:t> Why is the research important?  </a:t>
+            </a:r>
+          </a:p>
+          <a:p>
+            <a:r>
+              <a:rPr lang="en-US" sz="1200" kern="1200" dirty="0" smtClean="0">
+                <a:solidFill>
+                  <a:schemeClr val="tx1"/>
+                </a:solidFill>
+                <a:effectLst/>
+                <a:latin typeface="+mn-lt"/>
+                <a:ea typeface="+mn-ea"/>
+                <a:cs typeface="+mn-cs"/>
+              </a:rPr>
+              <a:t>Who is asking the research question?</a:t>
+            </a:r>
+          </a:p>
+          <a:p>
+            <a:r>
+              <a:rPr lang="en-US" sz="1200" kern="1200" dirty="0" smtClean="0">
+                <a:solidFill>
+                  <a:schemeClr val="tx1"/>
+                </a:solidFill>
+                <a:effectLst/>
+                <a:latin typeface="+mn-lt"/>
+                <a:ea typeface="+mn-ea"/>
+                <a:cs typeface="+mn-cs"/>
+              </a:rPr>
+              <a:t> Where did the data come from?  </a:t>
+            </a:r>
+          </a:p>
+          <a:p>
+            <a:r>
+              <a:rPr lang="en-US" sz="1200" kern="1200" dirty="0" smtClean="0">
+                <a:solidFill>
+                  <a:schemeClr val="tx1"/>
+                </a:solidFill>
+                <a:effectLst/>
+                <a:latin typeface="+mn-lt"/>
+                <a:ea typeface="+mn-ea"/>
+                <a:cs typeface="+mn-cs"/>
+              </a:rPr>
+              <a:t>How was the data collected?  </a:t>
+            </a:r>
+          </a:p>
+          <a:p>
+            <a:r>
+              <a:rPr lang="en-US" sz="1200" kern="1200" dirty="0" smtClean="0">
+                <a:solidFill>
+                  <a:schemeClr val="tx1"/>
+                </a:solidFill>
+                <a:effectLst/>
+                <a:latin typeface="+mn-lt"/>
+                <a:ea typeface="+mn-ea"/>
+                <a:cs typeface="+mn-cs"/>
+              </a:rPr>
+              <a:t>What did you have to do with the data?</a:t>
+            </a:r>
+            <a:endParaRPr lang="en-US" baseline="0" dirty="0" smtClean="0"/>
+          </a:p>
+          <a:p>
+            <a:endParaRPr lang="en-US" baseline="0" dirty="0" smtClean="0"/>
           </a:p>
           <a:p>
             <a:endParaRPr lang="en-US" baseline="0" dirty="0" smtClean="0"/>
@@ -2485,12 +2607,14 @@
           <a:lstStyle/>
           <a:p>
             <a:r>
-              <a:rPr lang="en-US" dirty="0" err="1" smtClean="0"/>
-              <a:t>Aaand</a:t>
+              <a:rPr lang="en-US" dirty="0" smtClean="0"/>
+              <a:t>Another example: last Wednesday</a:t>
             </a:r>
+          </a:p>
+          <a:p>
             <a:r>
               <a:rPr lang="en-US" dirty="0" smtClean="0"/>
-              <a:t> exercise, then break.</a:t>
+              <a:t>See: https://trello.com/c/GnNou0pw/333-garbage-redistribution-figures-for-howard-bauchner-presentation</a:t>
             </a:r>
             <a:endParaRPr lang="en-US" dirty="0"/>
           </a:p>
@@ -2522,6 +2646,98 @@
     </p:spTree>
     <p:extLst>
       <p:ext uri="{BB962C8B-B14F-4D97-AF65-F5344CB8AC3E}">
+        <p14:creationId xmlns:p14="http://schemas.microsoft.com/office/powerpoint/2010/main" val="3434934148"/>
+      </p:ext>
+    </p:extLst>
+  </p:cSld>
+  <p:clrMapOvr>
+    <a:masterClrMapping/>
+  </p:clrMapOvr>
+</p:notes>
+</file>
+
+<file path=ppt/notesSlides/notesSlide14.xml><?xml version="1.0" encoding="utf-8"?>
+<p:notes xmlns:a="http://schemas.openxmlformats.org/drawingml/2006/main" xmlns:r="http://schemas.openxmlformats.org/officeDocument/2006/relationships" xmlns:p="http://schemas.openxmlformats.org/presentationml/2006/main">
+  <p:cSld>
+    <p:spTree>
+      <p:nvGrpSpPr>
+        <p:cNvPr id="1" name=""/>
+        <p:cNvGrpSpPr/>
+        <p:nvPr/>
+      </p:nvGrpSpPr>
+      <p:grpSpPr>
+        <a:xfrm>
+          <a:off x="0" y="0"/>
+          <a:ext cx="0" cy="0"/>
+          <a:chOff x="0" y="0"/>
+          <a:chExt cx="0" cy="0"/>
+        </a:xfrm>
+      </p:grpSpPr>
+      <p:sp>
+        <p:nvSpPr>
+          <p:cNvPr id="2" name="Slide Image Placeholder 1"/>
+          <p:cNvSpPr>
+            <a:spLocks noGrp="1" noRot="1" noChangeAspect="1"/>
+          </p:cNvSpPr>
+          <p:nvPr>
+            <p:ph type="sldImg"/>
+          </p:nvPr>
+        </p:nvSpPr>
+        <p:spPr/>
+      </p:sp>
+      <p:sp>
+        <p:nvSpPr>
+          <p:cNvPr id="3" name="Notes Placeholder 2"/>
+          <p:cNvSpPr>
+            <a:spLocks noGrp="1"/>
+          </p:cNvSpPr>
+          <p:nvPr>
+            <p:ph type="body" idx="1"/>
+          </p:nvPr>
+        </p:nvSpPr>
+        <p:spPr/>
+        <p:txBody>
+          <a:bodyPr/>
+          <a:lstStyle/>
+          <a:p>
+            <a:r>
+              <a:rPr lang="en-US" dirty="0" err="1" smtClean="0"/>
+              <a:t>Aaand</a:t>
+            </a:r>
+            <a:r>
+              <a:rPr lang="en-US" dirty="0" smtClean="0"/>
+              <a:t> exercise, then break.</a:t>
+            </a:r>
+            <a:endParaRPr lang="en-US" dirty="0"/>
+          </a:p>
+        </p:txBody>
+      </p:sp>
+      <p:sp>
+        <p:nvSpPr>
+          <p:cNvPr id="4" name="Slide Number Placeholder 3"/>
+          <p:cNvSpPr>
+            <a:spLocks noGrp="1"/>
+          </p:cNvSpPr>
+          <p:nvPr>
+            <p:ph type="sldNum" sz="quarter" idx="10"/>
+          </p:nvPr>
+        </p:nvSpPr>
+        <p:spPr/>
+        <p:txBody>
+          <a:bodyPr/>
+          <a:lstStyle/>
+          <a:p>
+            <a:fld id="{D10C9AC4-446C-45D9-A8A8-E1DCCF98E2F5}" type="slidenum">
+              <a:rPr lang="en-US" smtClean="0"/>
+              <a:t>15</a:t>
+            </a:fld>
+            <a:endParaRPr lang="en-US"/>
+          </a:p>
+        </p:txBody>
+      </p:sp>
+    </p:spTree>
+    <p:extLst>
+      <p:ext uri="{BB962C8B-B14F-4D97-AF65-F5344CB8AC3E}">
         <p14:creationId xmlns:p14="http://schemas.microsoft.com/office/powerpoint/2010/main" val="3678617225"/>
       </p:ext>
     </p:extLst>
@@ -2532,7 +2748,7 @@
 </p:notes>
 </file>
 
-<file path=ppt/notesSlides/notesSlide14.xml><?xml version="1.0" encoding="utf-8"?>
+<file path=ppt/notesSlides/notesSlide15.xml><?xml version="1.0" encoding="utf-8"?>
 <p:notes xmlns:a="http://schemas.openxmlformats.org/drawingml/2006/main" xmlns:r="http://schemas.openxmlformats.org/officeDocument/2006/relationships" xmlns:p="http://schemas.openxmlformats.org/presentationml/2006/main">
   <p:cSld>
     <p:spTree>
@@ -2597,7 +2813,7 @@
           <a:p>
             <a:fld id="{D10C9AC4-446C-45D9-A8A8-E1DCCF98E2F5}" type="slidenum">
               <a:rPr lang="en-US" smtClean="0"/>
-              <a:t>17</a:t>
+              <a:t>18</a:t>
             </a:fld>
             <a:endParaRPr lang="en-US"/>
           </a:p>
@@ -2616,7 +2832,7 @@
 </p:notes>
 </file>
 
-<file path=ppt/notesSlides/notesSlide15.xml><?xml version="1.0" encoding="utf-8"?>
+<file path=ppt/notesSlides/notesSlide16.xml><?xml version="1.0" encoding="utf-8"?>
 <p:notes xmlns:a="http://schemas.openxmlformats.org/drawingml/2006/main" xmlns:r="http://schemas.openxmlformats.org/officeDocument/2006/relationships" xmlns:p="http://schemas.openxmlformats.org/presentationml/2006/main">
   <p:cSld>
     <p:spTree>
@@ -2675,9 +2891,52 @@
           <a:p>
             <a:r>
               <a:rPr lang="en-US" baseline="0" dirty="0" smtClean="0"/>
-              <a:t>Actually even better than that: you just tell the group of computers what you want done, and they arrange themselves</a:t>
+              <a:t>Actually even better than that: you just tell the </a:t>
             </a:r>
-            <a:endParaRPr lang="en-US" dirty="0"/>
+            <a:r>
+              <a:rPr lang="en-US" baseline="0" dirty="0" smtClean="0"/>
+              <a:t>group </a:t>
+            </a:r>
+            <a:r>
+              <a:rPr lang="en-US" baseline="0" dirty="0" smtClean="0"/>
+              <a:t>of computers what you want done, and they arrange </a:t>
+            </a:r>
+            <a:r>
+              <a:rPr lang="en-US" baseline="0" dirty="0" smtClean="0"/>
+              <a:t>themselves</a:t>
+            </a:r>
+          </a:p>
+          <a:p>
+            <a:endParaRPr lang="en-US" baseline="0" dirty="0" smtClean="0"/>
+          </a:p>
+          <a:p>
+            <a:r>
+              <a:rPr lang="en-US" baseline="0" dirty="0" smtClean="0"/>
+              <a:t>### coding example</a:t>
+            </a:r>
+          </a:p>
+          <a:p>
+            <a:endParaRPr lang="en-US" baseline="0" dirty="0" smtClean="0"/>
+          </a:p>
+          <a:p>
+            <a:r>
+              <a:rPr lang="en-US" baseline="0" dirty="0" smtClean="0"/>
+              <a:t>Afterwards: stress that when you’re building a system like this, you always start from linear and move outward, but it helps to have the big picture in mind.</a:t>
+            </a:r>
+          </a:p>
+          <a:p>
+            <a:endParaRPr lang="en-US" baseline="0" dirty="0" smtClean="0"/>
+          </a:p>
+          <a:p>
+            <a:r>
+              <a:rPr lang="en-US" baseline="0" dirty="0" smtClean="0"/>
+              <a:t>Show a counterexample: really long and heinous code (e.g. </a:t>
+            </a:r>
+            <a:r>
+              <a:rPr lang="en-US" baseline="0" smtClean="0"/>
+              <a:t>python extraction)</a:t>
+            </a:r>
+            <a:endParaRPr lang="en-US" baseline="0" dirty="0" smtClean="0"/>
           </a:p>
         </p:txBody>
       </p:sp>
@@ -2698,7 +2957,7 @@
           <a:p>
             <a:fld id="{D10C9AC4-446C-45D9-A8A8-E1DCCF98E2F5}" type="slidenum">
               <a:rPr lang="en-US" smtClean="0"/>
-              <a:t>25</a:t>
+              <a:t>26</a:t>
             </a:fld>
             <a:endParaRPr lang="en-US"/>
           </a:p>
@@ -6546,28 +6805,95 @@
           </a:p>
         </p:txBody>
       </p:sp>
-      <p:sp>
-        <p:nvSpPr>
-          <p:cNvPr id="5" name="Content Placeholder 4"/>
-          <p:cNvSpPr>
-            <a:spLocks noGrp="1"/>
-          </p:cNvSpPr>
-          <p:nvPr>
-            <p:ph idx="1"/>
-          </p:nvPr>
-        </p:nvSpPr>
-        <p:spPr/>
-        <p:txBody>
-          <a:bodyPr/>
-          <a:lstStyle/>
-          <a:p>
-            <a:pPr marL="0" indent="0">
-              <a:buNone/>
-            </a:pPr>
-            <a:endParaRPr lang="en-US" dirty="0"/>
-          </a:p>
-        </p:txBody>
-      </p:sp>
+      <p:pic>
+        <p:nvPicPr>
+          <p:cNvPr id="1026" name="Picture 2" descr="http://www.healthdata.org/sites/all/themes/ihmeuw/logo.png"/>
+          <p:cNvPicPr>
+            <a:picLocks noChangeAspect="1" noChangeArrowheads="1"/>
+          </p:cNvPicPr>
+          <p:nvPr/>
+        </p:nvPicPr>
+        <p:blipFill>
+          <a:blip r:embed="rId3">
+            <a:extLst>
+              <a:ext uri="{28A0092B-C50C-407E-A947-70E740481C1C}">
+                <a14:useLocalDpi xmlns:a14="http://schemas.microsoft.com/office/drawing/2010/main" val="0"/>
+              </a:ext>
+            </a:extLst>
+          </a:blip>
+          <a:srcRect/>
+          <a:stretch>
+            <a:fillRect/>
+          </a:stretch>
+        </p:blipFill>
+        <p:spPr bwMode="auto">
+          <a:xfrm>
+            <a:off x="838200" y="1950721"/>
+            <a:ext cx="3530061" cy="1125728"/>
+          </a:xfrm>
+          <a:prstGeom prst="rect">
+            <a:avLst/>
+          </a:prstGeom>
+          <a:noFill/>
+          <a:extLst>
+            <a:ext uri="{909E8E84-426E-40DD-AFC4-6F175D3DCCD1}">
+              <a14:hiddenFill xmlns:a14="http://schemas.microsoft.com/office/drawing/2010/main">
+                <a:solidFill>
+                  <a:srgbClr val="FFFFFF"/>
+                </a:solidFill>
+              </a14:hiddenFill>
+            </a:ext>
+          </a:extLst>
+        </p:spPr>
+      </p:pic>
+      <p:pic>
+        <p:nvPicPr>
+          <p:cNvPr id="2" name="Picture 1"/>
+          <p:cNvPicPr>
+            <a:picLocks noChangeAspect="1"/>
+          </p:cNvPicPr>
+          <p:nvPr/>
+        </p:nvPicPr>
+        <p:blipFill>
+          <a:blip r:embed="rId4"/>
+          <a:stretch>
+            <a:fillRect/>
+          </a:stretch>
+        </p:blipFill>
+        <p:spPr>
+          <a:xfrm>
+            <a:off x="6339840" y="746964"/>
+            <a:ext cx="4864608" cy="3533242"/>
+          </a:xfrm>
+          <a:prstGeom prst="rect">
+            <a:avLst/>
+          </a:prstGeom>
+        </p:spPr>
+      </p:pic>
+      <p:pic>
+        <p:nvPicPr>
+          <p:cNvPr id="3" name="Picture 2"/>
+          <p:cNvPicPr>
+            <a:picLocks noChangeAspect="1"/>
+          </p:cNvPicPr>
+          <p:nvPr/>
+        </p:nvPicPr>
+        <p:blipFill>
+          <a:blip r:embed="rId5"/>
+          <a:stretch>
+            <a:fillRect/>
+          </a:stretch>
+        </p:blipFill>
+        <p:spPr>
+          <a:xfrm>
+            <a:off x="3386860" y="3580218"/>
+            <a:ext cx="2419048" cy="2428571"/>
+          </a:xfrm>
+          <a:prstGeom prst="rect">
+            <a:avLst/>
+          </a:prstGeom>
+        </p:spPr>
+      </p:pic>
     </p:spTree>
     <p:extLst>
       <p:ext uri="{BB962C8B-B14F-4D97-AF65-F5344CB8AC3E}">
@@ -6644,15 +6970,10 @@
                             </p:stCondLst>
                             <p:childTnLst>
                               <p:par>
-                                <p:cTn id="9" presetID="1" presetClass="entr" presetSubtype="0" fill="hold" nodeType="clickEffect" nodePh="1">
+                                <p:cTn id="9" presetID="1" presetClass="entr" presetSubtype="0" fill="hold" nodeType="clickEffect">
                                   <p:stCondLst>
                                     <p:cond delay="0"/>
                                   </p:stCondLst>
-                                  <p:endCondLst>
-                                    <p:cond evt="begin" delay="0">
-                                      <p:tn val="9"/>
-                                    </p:cond>
-                                  </p:endCondLst>
                                   <p:childTnLst>
                                     <p:set>
                                       <p:cBhvr>
@@ -6662,11 +6983,97 @@
                                           </p:stCondLst>
                                         </p:cTn>
                                         <p:tgtEl>
-                                          <p:spTgt spid="5">
-                                            <p:txEl>
-                                              <p:pRg st="0" end="0"/>
-                                            </p:txEl>
-                                          </p:spTgt>
+                                          <p:spTgt spid="1026"/>
+                                        </p:tgtEl>
+                                        <p:attrNameLst>
+                                          <p:attrName>style.visibility</p:attrName>
+                                        </p:attrNameLst>
+                                      </p:cBhvr>
+                                      <p:to>
+                                        <p:strVal val="visible"/>
+                                      </p:to>
+                                    </p:set>
+                                  </p:childTnLst>
+                                </p:cTn>
+                              </p:par>
+                            </p:childTnLst>
+                          </p:cTn>
+                        </p:par>
+                      </p:childTnLst>
+                    </p:cTn>
+                  </p:par>
+                  <p:par>
+                    <p:cTn id="11" fill="hold">
+                      <p:stCondLst>
+                        <p:cond delay="indefinite"/>
+                      </p:stCondLst>
+                      <p:childTnLst>
+                        <p:par>
+                          <p:cTn id="12" fill="hold">
+                            <p:stCondLst>
+                              <p:cond delay="0"/>
+                            </p:stCondLst>
+                            <p:childTnLst>
+                              <p:par>
+                                <p:cTn id="13" presetID="1" presetClass="entr" presetSubtype="0" fill="hold" nodeType="clickEffect">
+                                  <p:stCondLst>
+                                    <p:cond delay="0"/>
+                                  </p:stCondLst>
+                                  <p:childTnLst>
+                                    <p:set>
+                                      <p:cBhvr>
+                                        <p:cTn id="14" dur="1" fill="hold">
+                                          <p:stCondLst>
+                                            <p:cond delay="0"/>
+                                          </p:stCondLst>
+                                        </p:cTn>
+                                        <p:tgtEl>
+                                          <p:spTgt spid="2"/>
+                                        </p:tgtEl>
+                                        <p:attrNameLst>
+                                          <p:attrName>style.visibility</p:attrName>
+                                        </p:attrNameLst>
+                                      </p:cBhvr>
+                                      <p:to>
+                                        <p:strVal val="visible"/>
+                                      </p:to>
+                                    </p:set>
+                                  </p:childTnLst>
+                                </p:cTn>
+                              </p:par>
+                            </p:childTnLst>
+                          </p:cTn>
+                        </p:par>
+                      </p:childTnLst>
+                    </p:cTn>
+                  </p:par>
+                  <p:par>
+                    <p:cTn id="15" fill="hold">
+                      <p:stCondLst>
+                        <p:cond delay="indefinite"/>
+                      </p:stCondLst>
+                      <p:childTnLst>
+                        <p:par>
+                          <p:cTn id="16" fill="hold">
+                            <p:stCondLst>
+                              <p:cond delay="0"/>
+                            </p:stCondLst>
+                            <p:childTnLst>
+                              <p:par>
+                                <p:cTn id="17" presetID="1" presetClass="entr" presetSubtype="0" fill="hold" nodeType="clickEffect">
+                                  <p:stCondLst>
+                                    <p:cond delay="0"/>
+                                  </p:stCondLst>
+                                  <p:childTnLst>
+                                    <p:set>
+                                      <p:cBhvr>
+                                        <p:cTn id="18" dur="1" fill="hold">
+                                          <p:stCondLst>
+                                            <p:cond delay="0"/>
+                                          </p:stCondLst>
+                                        </p:cTn>
+                                        <p:tgtEl>
+                                          <p:spTgt spid="3"/>
                                         </p:tgtEl>
                                         <p:attrNameLst>
                                           <p:attrName>style.visibility</p:attrName>
@@ -7828,6 +8235,67 @@
           <a:chExt cx="0" cy="0"/>
         </a:xfrm>
       </p:grpSpPr>
+      <p:pic>
+        <p:nvPicPr>
+          <p:cNvPr id="2" name="Picture 1"/>
+          <p:cNvPicPr>
+            <a:picLocks noChangeAspect="1"/>
+          </p:cNvPicPr>
+          <p:nvPr/>
+        </p:nvPicPr>
+        <p:blipFill>
+          <a:blip r:embed="rId3"/>
+          <a:stretch>
+            <a:fillRect/>
+          </a:stretch>
+        </p:blipFill>
+        <p:spPr>
+          <a:xfrm>
+            <a:off x="-158010" y="1588482"/>
+            <a:ext cx="12350010" cy="4038591"/>
+          </a:xfrm>
+          <a:prstGeom prst="rect">
+            <a:avLst/>
+          </a:prstGeom>
+        </p:spPr>
+      </p:pic>
+    </p:spTree>
+    <p:extLst>
+      <p:ext uri="{BB962C8B-B14F-4D97-AF65-F5344CB8AC3E}">
+        <p14:creationId xmlns:p14="http://schemas.microsoft.com/office/powerpoint/2010/main" val="1892221556"/>
+      </p:ext>
+    </p:extLst>
+  </p:cSld>
+  <p:clrMapOvr>
+    <a:masterClrMapping/>
+  </p:clrMapOvr>
+  <p:timing>
+    <p:tnLst>
+      <p:par>
+        <p:cTn id="1" dur="indefinite" restart="never" nodeType="tmRoot"/>
+      </p:par>
+    </p:tnLst>
+  </p:timing>
+</p:sld>
+</file>
+
+<file path=ppt/slides/slide15.xml><?xml version="1.0" encoding="utf-8"?>
+<p:sld xmlns:a="http://schemas.openxmlformats.org/drawingml/2006/main" xmlns:r="http://schemas.openxmlformats.org/officeDocument/2006/relationships" xmlns:p="http://schemas.openxmlformats.org/presentationml/2006/main">
+  <p:cSld>
+    <p:spTree>
+      <p:nvGrpSpPr>
+        <p:cNvPr id="1" name=""/>
+        <p:cNvGrpSpPr/>
+        <p:nvPr/>
+      </p:nvGrpSpPr>
+      <p:grpSpPr>
+        <a:xfrm>
+          <a:off x="0" y="0"/>
+          <a:ext cx="0" cy="0"/>
+          <a:chOff x="0" y="0"/>
+          <a:chExt cx="0" cy="0"/>
+        </a:xfrm>
+      </p:grpSpPr>
       <p:sp>
         <p:nvSpPr>
           <p:cNvPr id="2" name="TextBox 1"/>
@@ -7890,7 +8358,7 @@
 </p:sld>
 </file>
 
-<file path=ppt/slides/slide15.xml><?xml version="1.0" encoding="utf-8"?>
+<file path=ppt/slides/slide16.xml><?xml version="1.0" encoding="utf-8"?>
 <p:sld xmlns:a="http://schemas.openxmlformats.org/drawingml/2006/main" xmlns:r="http://schemas.openxmlformats.org/officeDocument/2006/relationships" xmlns:p="http://schemas.openxmlformats.org/presentationml/2006/main">
   <p:cSld>
     <p:spTree>
@@ -7947,19 +8415,39 @@
           <a:p>
             <a:r>
               <a:rPr lang="en-US" dirty="0" smtClean="0"/>
-              <a:t>Conceptual framework vs reality of code</a:t>
+              <a:t>Coding scenarios</a:t>
             </a:r>
+          </a:p>
+          <a:p>
+            <a:pPr lvl="1"/>
+            <a:r>
+              <a:rPr lang="en-US" dirty="0" smtClean="0"/>
+              <a:t>Linear</a:t>
+            </a:r>
+          </a:p>
+          <a:p>
+            <a:pPr lvl="1"/>
+            <a:r>
+              <a:rPr lang="en-US" dirty="0" smtClean="0"/>
+              <a:t>Functional</a:t>
+            </a:r>
+          </a:p>
+          <a:p>
+            <a:pPr lvl="1"/>
+            <a:r>
+              <a:rPr lang="en-US" dirty="0" smtClean="0"/>
+              <a:t>Parallelized</a:t>
+            </a:r>
+            <a:endParaRPr lang="en-US" dirty="0" smtClean="0"/>
           </a:p>
           <a:p>
             <a:r>
               <a:rPr lang="en-US" dirty="0" smtClean="0"/>
-              <a:t>Managing workflow: functions, master files, parallelization</a:t>
+              <a:t>Real-life </a:t>
             </a:r>
-          </a:p>
-          <a:p>
             <a:r>
               <a:rPr lang="en-US" dirty="0" smtClean="0"/>
-              <a:t>Real-life examples along the way</a:t>
+              <a:t>examples along the way</a:t>
             </a:r>
           </a:p>
           <a:p>
@@ -8132,6 +8620,104 @@
                       </p:childTnLst>
                     </p:cTn>
                   </p:par>
+                  <p:par>
+                    <p:cTn id="15" fill="hold">
+                      <p:stCondLst>
+                        <p:cond delay="indefinite"/>
+                      </p:stCondLst>
+                      <p:childTnLst>
+                        <p:par>
+                          <p:cTn id="16" fill="hold">
+                            <p:stCondLst>
+                              <p:cond delay="0"/>
+                            </p:stCondLst>
+                            <p:childTnLst>
+                              <p:par>
+                                <p:cTn id="17" presetID="1" presetClass="entr" presetSubtype="0" fill="hold" nodeType="clickEffect">
+                                  <p:stCondLst>
+                                    <p:cond delay="0"/>
+                                  </p:stCondLst>
+                                  <p:childTnLst>
+                                    <p:set>
+                                      <p:cBhvr>
+                                        <p:cTn id="18" dur="1" fill="hold">
+                                          <p:stCondLst>
+                                            <p:cond delay="0"/>
+                                          </p:stCondLst>
+                                        </p:cTn>
+                                        <p:tgtEl>
+                                          <p:spTgt spid="3">
+                                            <p:txEl>
+                                              <p:pRg st="3" end="3"/>
+                                            </p:txEl>
+                                          </p:spTgt>
+                                        </p:tgtEl>
+                                        <p:attrNameLst>
+                                          <p:attrName>style.visibility</p:attrName>
+                                        </p:attrNameLst>
+                                      </p:cBhvr>
+                                      <p:to>
+                                        <p:strVal val="visible"/>
+                                      </p:to>
+                                    </p:set>
+                                  </p:childTnLst>
+                                </p:cTn>
+                              </p:par>
+                            </p:childTnLst>
+                          </p:cTn>
+                        </p:par>
+                      </p:childTnLst>
+                    </p:cTn>
+                  </p:par>
+                  <p:par>
+                    <p:cTn id="19" fill="hold">
+                      <p:stCondLst>
+                        <p:cond delay="indefinite"/>
+                      </p:stCondLst>
+                      <p:childTnLst>
+                        <p:par>
+                          <p:cTn id="20" fill="hold">
+                            <p:stCondLst>
+                              <p:cond delay="0"/>
+                            </p:stCondLst>
+                            <p:childTnLst>
+                              <p:par>
+                                <p:cTn id="21" presetID="1" presetClass="entr" presetSubtype="0" fill="hold" nodeType="clickEffect">
+                                  <p:stCondLst>
+                                    <p:cond delay="0"/>
+                                  </p:stCondLst>
+                                  <p:childTnLst>
+                                    <p:set>
+                                      <p:cBhvr>
+                                        <p:cTn id="22" dur="1" fill="hold">
+                                          <p:stCondLst>
+                                            <p:cond delay="0"/>
+                                          </p:stCondLst>
+                                        </p:cTn>
+                                        <p:tgtEl>
+                                          <p:spTgt spid="3">
+                                            <p:txEl>
+                                              <p:pRg st="4" end="4"/>
+                                            </p:txEl>
+                                          </p:spTgt>
+                                        </p:tgtEl>
+                                        <p:attrNameLst>
+                                          <p:attrName>style.visibility</p:attrName>
+                                        </p:attrNameLst>
+                                      </p:cBhvr>
+                                      <p:to>
+                                        <p:strVal val="visible"/>
+                                      </p:to>
+                                    </p:set>
+                                  </p:childTnLst>
+                                </p:cTn>
+                              </p:par>
+                            </p:childTnLst>
+                          </p:cTn>
+                        </p:par>
+                      </p:childTnLst>
+                    </p:cTn>
+                  </p:par>
                 </p:childTnLst>
               </p:cTn>
               <p:prevCondLst>
@@ -8157,7 +8743,7 @@
 </p:sld>
 </file>
 
-<file path=ppt/slides/slide16.xml><?xml version="1.0" encoding="utf-8"?>
+<file path=ppt/slides/slide17.xml><?xml version="1.0" encoding="utf-8"?>
 <p:sld xmlns:a="http://schemas.openxmlformats.org/drawingml/2006/main" xmlns:r="http://schemas.openxmlformats.org/officeDocument/2006/relationships" xmlns:p="http://schemas.openxmlformats.org/presentationml/2006/main">
   <p:cSld>
     <p:spTree>
@@ -11102,7 +11688,7 @@
 </p:sld>
 </file>
 
-<file path=ppt/slides/slide17.xml><?xml version="1.0" encoding="utf-8"?>
+<file path=ppt/slides/slide18.xml><?xml version="1.0" encoding="utf-8"?>
 <p:sld xmlns:a="http://schemas.openxmlformats.org/drawingml/2006/main" xmlns:r="http://schemas.openxmlformats.org/officeDocument/2006/relationships" xmlns:p="http://schemas.openxmlformats.org/presentationml/2006/main">
   <p:cSld>
     <p:spTree>
@@ -11426,7 +12012,7 @@
 </p:sld>
 </file>
 
-<file path=ppt/slides/slide18.xml><?xml version="1.0" encoding="utf-8"?>
+<file path=ppt/slides/slide19.xml><?xml version="1.0" encoding="utf-8"?>
 <p:sld xmlns:a="http://schemas.openxmlformats.org/drawingml/2006/main" xmlns:r="http://schemas.openxmlformats.org/officeDocument/2006/relationships" xmlns:p="http://schemas.openxmlformats.org/presentationml/2006/main">
   <p:cSld>
     <p:spTree>
@@ -17289,7 +17875,278 @@
 </p:sld>
 </file>
 
-<file path=ppt/slides/slide19.xml><?xml version="1.0" encoding="utf-8"?>
+<file path=ppt/slides/slide2.xml><?xml version="1.0" encoding="utf-8"?>
+<p:sld xmlns:a="http://schemas.openxmlformats.org/drawingml/2006/main" xmlns:r="http://schemas.openxmlformats.org/officeDocument/2006/relationships" xmlns:p="http://schemas.openxmlformats.org/presentationml/2006/main">
+  <p:cSld>
+    <p:spTree>
+      <p:nvGrpSpPr>
+        <p:cNvPr id="1" name=""/>
+        <p:cNvGrpSpPr/>
+        <p:nvPr/>
+      </p:nvGrpSpPr>
+      <p:grpSpPr>
+        <a:xfrm>
+          <a:off x="0" y="0"/>
+          <a:ext cx="0" cy="0"/>
+          <a:chOff x="0" y="0"/>
+          <a:chExt cx="0" cy="0"/>
+        </a:xfrm>
+      </p:grpSpPr>
+      <p:sp>
+        <p:nvSpPr>
+          <p:cNvPr id="2" name="Title 1"/>
+          <p:cNvSpPr>
+            <a:spLocks noGrp="1"/>
+          </p:cNvSpPr>
+          <p:nvPr>
+            <p:ph type="title"/>
+          </p:nvPr>
+        </p:nvSpPr>
+        <p:spPr/>
+        <p:txBody>
+          <a:bodyPr/>
+          <a:lstStyle/>
+          <a:p>
+            <a:r>
+              <a:rPr lang="en-US" dirty="0" smtClean="0"/>
+              <a:t>Visualization</a:t>
+            </a:r>
+            <a:endParaRPr lang="en-US" dirty="0"/>
+          </a:p>
+        </p:txBody>
+      </p:sp>
+      <p:sp>
+        <p:nvSpPr>
+          <p:cNvPr id="3" name="Content Placeholder 2"/>
+          <p:cNvSpPr>
+            <a:spLocks noGrp="1"/>
+          </p:cNvSpPr>
+          <p:nvPr>
+            <p:ph idx="1"/>
+          </p:nvPr>
+        </p:nvSpPr>
+        <p:spPr/>
+        <p:txBody>
+          <a:bodyPr/>
+          <a:lstStyle/>
+          <a:p>
+            <a:r>
+              <a:rPr lang="en-US" dirty="0" smtClean="0"/>
+              <a:t>Theory: tool selection and tradeoffs</a:t>
+            </a:r>
+          </a:p>
+          <a:p>
+            <a:r>
+              <a:rPr lang="en-US" dirty="0"/>
+              <a:t>g</a:t>
+            </a:r>
+            <a:r>
+              <a:rPr lang="en-US" dirty="0" smtClean="0"/>
+              <a:t>gplot2: an introduction</a:t>
+            </a:r>
+          </a:p>
+          <a:p>
+            <a:r>
+              <a:rPr lang="en-US" dirty="0" smtClean="0"/>
+              <a:t>Exercise</a:t>
+            </a:r>
+          </a:p>
+          <a:p>
+            <a:endParaRPr lang="en-US" dirty="0"/>
+          </a:p>
+        </p:txBody>
+      </p:sp>
+    </p:spTree>
+    <p:extLst>
+      <p:ext uri="{BB962C8B-B14F-4D97-AF65-F5344CB8AC3E}">
+        <p14:creationId xmlns:p14="http://schemas.microsoft.com/office/powerpoint/2010/main" val="1821083450"/>
+      </p:ext>
+    </p:extLst>
+  </p:cSld>
+  <p:clrMapOvr>
+    <a:masterClrMapping/>
+  </p:clrMapOvr>
+  <p:timing>
+    <p:tnLst>
+      <p:par>
+        <p:cTn id="1" dur="indefinite" restart="never" nodeType="tmRoot">
+          <p:childTnLst>
+            <p:seq concurrent="1" nextAc="seek">
+              <p:cTn id="2" dur="indefinite" nodeType="mainSeq">
+                <p:childTnLst>
+                  <p:par>
+                    <p:cTn id="3" fill="hold">
+                      <p:stCondLst>
+                        <p:cond delay="indefinite"/>
+                      </p:stCondLst>
+                      <p:childTnLst>
+                        <p:par>
+                          <p:cTn id="4" fill="hold">
+                            <p:stCondLst>
+                              <p:cond delay="0"/>
+                            </p:stCondLst>
+                            <p:childTnLst>
+                              <p:par>
+                                <p:cTn id="5" presetID="1" presetClass="entr" presetSubtype="0" fill="hold" nodeType="clickEffect">
+                                  <p:stCondLst>
+                                    <p:cond delay="0"/>
+                                  </p:stCondLst>
+                                  <p:childTnLst>
+                                    <p:set>
+                                      <p:cBhvr>
+                                        <p:cTn id="6" dur="1" fill="hold">
+                                          <p:stCondLst>
+                                            <p:cond delay="0"/>
+                                          </p:stCondLst>
+                                        </p:cTn>
+                                        <p:tgtEl>
+                                          <p:spTgt spid="3">
+                                            <p:txEl>
+                                              <p:pRg st="0" end="0"/>
+                                            </p:txEl>
+                                          </p:spTgt>
+                                        </p:tgtEl>
+                                        <p:attrNameLst>
+                                          <p:attrName>style.visibility</p:attrName>
+                                        </p:attrNameLst>
+                                      </p:cBhvr>
+                                      <p:to>
+                                        <p:strVal val="visible"/>
+                                      </p:to>
+                                    </p:set>
+                                  </p:childTnLst>
+                                </p:cTn>
+                              </p:par>
+                            </p:childTnLst>
+                          </p:cTn>
+                        </p:par>
+                      </p:childTnLst>
+                    </p:cTn>
+                  </p:par>
+                  <p:par>
+                    <p:cTn id="7" fill="hold">
+                      <p:stCondLst>
+                        <p:cond delay="indefinite"/>
+                      </p:stCondLst>
+                      <p:childTnLst>
+                        <p:par>
+                          <p:cTn id="8" fill="hold">
+                            <p:stCondLst>
+                              <p:cond delay="0"/>
+                            </p:stCondLst>
+                            <p:childTnLst>
+                              <p:par>
+                                <p:cTn id="9" presetID="1" presetClass="entr" presetSubtype="0" fill="hold" nodeType="clickEffect">
+                                  <p:stCondLst>
+                                    <p:cond delay="0"/>
+                                  </p:stCondLst>
+                                  <p:childTnLst>
+                                    <p:set>
+                                      <p:cBhvr>
+                                        <p:cTn id="10" dur="1" fill="hold">
+                                          <p:stCondLst>
+                                            <p:cond delay="0"/>
+                                          </p:stCondLst>
+                                        </p:cTn>
+                                        <p:tgtEl>
+                                          <p:spTgt spid="3">
+                                            <p:txEl>
+                                              <p:pRg st="1" end="1"/>
+                                            </p:txEl>
+                                          </p:spTgt>
+                                        </p:tgtEl>
+                                        <p:attrNameLst>
+                                          <p:attrName>style.visibility</p:attrName>
+                                        </p:attrNameLst>
+                                      </p:cBhvr>
+                                      <p:to>
+                                        <p:strVal val="visible"/>
+                                      </p:to>
+                                    </p:set>
+                                  </p:childTnLst>
+                                </p:cTn>
+                              </p:par>
+                            </p:childTnLst>
+                          </p:cTn>
+                        </p:par>
+                      </p:childTnLst>
+                    </p:cTn>
+                  </p:par>
+                  <p:par>
+                    <p:cTn id="11" fill="hold">
+                      <p:stCondLst>
+                        <p:cond delay="indefinite"/>
+                      </p:stCondLst>
+                      <p:childTnLst>
+                        <p:par>
+                          <p:cTn id="12" fill="hold">
+                            <p:stCondLst>
+                              <p:cond delay="0"/>
+                            </p:stCondLst>
+                            <p:childTnLst>
+                              <p:par>
+                                <p:cTn id="13" presetID="1" presetClass="entr" presetSubtype="0" fill="hold" nodeType="clickEffect">
+                                  <p:stCondLst>
+                                    <p:cond delay="0"/>
+                                  </p:stCondLst>
+                                  <p:childTnLst>
+                                    <p:set>
+                                      <p:cBhvr>
+                                        <p:cTn id="14" dur="1" fill="hold">
+                                          <p:stCondLst>
+                                            <p:cond delay="0"/>
+                                          </p:stCondLst>
+                                        </p:cTn>
+                                        <p:tgtEl>
+                                          <p:spTgt spid="3">
+                                            <p:txEl>
+                                              <p:pRg st="2" end="2"/>
+                                            </p:txEl>
+                                          </p:spTgt>
+                                        </p:tgtEl>
+                                        <p:attrNameLst>
+                                          <p:attrName>style.visibility</p:attrName>
+                                        </p:attrNameLst>
+                                      </p:cBhvr>
+                                      <p:to>
+                                        <p:strVal val="visible"/>
+                                      </p:to>
+                                    </p:set>
+                                  </p:childTnLst>
+                                </p:cTn>
+                              </p:par>
+                            </p:childTnLst>
+                          </p:cTn>
+                        </p:par>
+                      </p:childTnLst>
+                    </p:cTn>
+                  </p:par>
+                </p:childTnLst>
+              </p:cTn>
+              <p:prevCondLst>
+                <p:cond evt="onPrev" delay="0">
+                  <p:tgtEl>
+                    <p:sldTgt/>
+                  </p:tgtEl>
+                </p:cond>
+              </p:prevCondLst>
+              <p:nextCondLst>
+                <p:cond evt="onNext" delay="0">
+                  <p:tgtEl>
+                    <p:sldTgt/>
+                  </p:tgtEl>
+                </p:cond>
+              </p:nextCondLst>
+            </p:seq>
+          </p:childTnLst>
+        </p:cTn>
+      </p:par>
+    </p:tnLst>
+  </p:timing>
+</p:sld>
+</file>
+
+<file path=ppt/slides/slide20.xml><?xml version="1.0" encoding="utf-8"?>
 <p:sld xmlns:a="http://schemas.openxmlformats.org/drawingml/2006/main" xmlns:r="http://schemas.openxmlformats.org/officeDocument/2006/relationships" xmlns:p="http://schemas.openxmlformats.org/presentationml/2006/main">
   <p:cSld>
     <p:spTree>
@@ -17627,108 +18484,7 @@
 </p:sld>
 </file>
 
-<file path=ppt/slides/slide2.xml><?xml version="1.0" encoding="utf-8"?>
-<p:sld xmlns:a="http://schemas.openxmlformats.org/drawingml/2006/main" xmlns:r="http://schemas.openxmlformats.org/officeDocument/2006/relationships" xmlns:p="http://schemas.openxmlformats.org/presentationml/2006/main">
-  <p:cSld>
-    <p:spTree>
-      <p:nvGrpSpPr>
-        <p:cNvPr id="1" name=""/>
-        <p:cNvGrpSpPr/>
-        <p:nvPr/>
-      </p:nvGrpSpPr>
-      <p:grpSpPr>
-        <a:xfrm>
-          <a:off x="0" y="0"/>
-          <a:ext cx="0" cy="0"/>
-          <a:chOff x="0" y="0"/>
-          <a:chExt cx="0" cy="0"/>
-        </a:xfrm>
-      </p:grpSpPr>
-      <p:sp>
-        <p:nvSpPr>
-          <p:cNvPr id="2" name="Title 1"/>
-          <p:cNvSpPr>
-            <a:spLocks noGrp="1"/>
-          </p:cNvSpPr>
-          <p:nvPr>
-            <p:ph type="title"/>
-          </p:nvPr>
-        </p:nvSpPr>
-        <p:spPr/>
-        <p:txBody>
-          <a:bodyPr/>
-          <a:lstStyle/>
-          <a:p>
-            <a:r>
-              <a:rPr lang="en-US" dirty="0" smtClean="0"/>
-              <a:t>Visualization</a:t>
-            </a:r>
-            <a:endParaRPr lang="en-US" dirty="0"/>
-          </a:p>
-        </p:txBody>
-      </p:sp>
-      <p:sp>
-        <p:nvSpPr>
-          <p:cNvPr id="3" name="Content Placeholder 2"/>
-          <p:cNvSpPr>
-            <a:spLocks noGrp="1"/>
-          </p:cNvSpPr>
-          <p:nvPr>
-            <p:ph idx="1"/>
-          </p:nvPr>
-        </p:nvSpPr>
-        <p:spPr/>
-        <p:txBody>
-          <a:bodyPr/>
-          <a:lstStyle/>
-          <a:p>
-            <a:r>
-              <a:rPr lang="en-US" dirty="0" smtClean="0"/>
-              <a:t>Theory: tool selection and tradeoffs</a:t>
-            </a:r>
-          </a:p>
-          <a:p>
-            <a:r>
-              <a:rPr lang="en-US" dirty="0"/>
-              <a:t>g</a:t>
-            </a:r>
-            <a:r>
-              <a:rPr lang="en-US" dirty="0" smtClean="0"/>
-              <a:t>gplot2: an introduction</a:t>
-            </a:r>
-          </a:p>
-          <a:p>
-            <a:r>
-              <a:rPr lang="en-US" dirty="0" smtClean="0"/>
-              <a:t>Exercise</a:t>
-            </a:r>
-          </a:p>
-          <a:p>
-            <a:endParaRPr lang="en-US" dirty="0"/>
-          </a:p>
-        </p:txBody>
-      </p:sp>
-    </p:spTree>
-    <p:extLst>
-      <p:ext uri="{BB962C8B-B14F-4D97-AF65-F5344CB8AC3E}">
-        <p14:creationId xmlns:p14="http://schemas.microsoft.com/office/powerpoint/2010/main" val="1821083450"/>
-      </p:ext>
-    </p:extLst>
-  </p:cSld>
-  <p:clrMapOvr>
-    <a:masterClrMapping/>
-  </p:clrMapOvr>
-  <p:timing>
-    <p:tnLst>
-      <p:par>
-        <p:cTn id="1" dur="indefinite" restart="never" nodeType="tmRoot"/>
-      </p:par>
-    </p:tnLst>
-  </p:timing>
-</p:sld>
-</file>
-
-<file path=ppt/slides/slide20.xml><?xml version="1.0" encoding="utf-8"?>
+<file path=ppt/slides/slide21.xml><?xml version="1.0" encoding="utf-8"?>
 <p:sld xmlns:a="http://schemas.openxmlformats.org/drawingml/2006/main" xmlns:r="http://schemas.openxmlformats.org/officeDocument/2006/relationships" xmlns:p="http://schemas.openxmlformats.org/presentationml/2006/main">
   <p:cSld>
     <p:spTree>
@@ -22840,7 +23596,7 @@
 </p:sld>
 </file>
 
-<file path=ppt/slides/slide21.xml><?xml version="1.0" encoding="utf-8"?>
+<file path=ppt/slides/slide22.xml><?xml version="1.0" encoding="utf-8"?>
 <p:sld xmlns:a="http://schemas.openxmlformats.org/drawingml/2006/main" xmlns:r="http://schemas.openxmlformats.org/officeDocument/2006/relationships" xmlns:p="http://schemas.openxmlformats.org/presentationml/2006/main">
   <p:cSld>
     <p:spTree>
@@ -28197,7 +28953,7 @@
 </p:sld>
 </file>
 
-<file path=ppt/slides/slide22.xml><?xml version="1.0" encoding="utf-8"?>
+<file path=ppt/slides/slide23.xml><?xml version="1.0" encoding="utf-8"?>
 <p:sld xmlns:a="http://schemas.openxmlformats.org/drawingml/2006/main" xmlns:r="http://schemas.openxmlformats.org/officeDocument/2006/relationships" xmlns:p="http://schemas.openxmlformats.org/presentationml/2006/main">
   <p:cSld>
     <p:spTree>
@@ -34454,7 +35210,7 @@
 </p:sld>
 </file>
 
-<file path=ppt/slides/slide23.xml><?xml version="1.0" encoding="utf-8"?>
+<file path=ppt/slides/slide24.xml><?xml version="1.0" encoding="utf-8"?>
 <p:sld xmlns:a="http://schemas.openxmlformats.org/drawingml/2006/main" xmlns:r="http://schemas.openxmlformats.org/officeDocument/2006/relationships" xmlns:p="http://schemas.openxmlformats.org/presentationml/2006/main">
   <p:cSld>
     <p:spTree>
@@ -48669,7 +49425,7 @@
 </p:sld>
 </file>
 
-<file path=ppt/slides/slide24.xml><?xml version="1.0" encoding="utf-8"?>
+<file path=ppt/slides/slide25.xml><?xml version="1.0" encoding="utf-8"?>
 <p:sld xmlns:a="http://schemas.openxmlformats.org/drawingml/2006/main" xmlns:r="http://schemas.openxmlformats.org/officeDocument/2006/relationships" xmlns:p="http://schemas.openxmlformats.org/presentationml/2006/main">
   <p:cSld>
     <p:spTree>
@@ -49061,7 +49817,7 @@
 </p:sld>
 </file>
 
-<file path=ppt/slides/slide25.xml><?xml version="1.0" encoding="utf-8"?>
+<file path=ppt/slides/slide26.xml><?xml version="1.0" encoding="utf-8"?>
 <p:sld xmlns:a="http://schemas.openxmlformats.org/drawingml/2006/main" xmlns:r="http://schemas.openxmlformats.org/officeDocument/2006/relationships" xmlns:p="http://schemas.openxmlformats.org/presentationml/2006/main">
   <p:cSld>
     <p:spTree>
@@ -50272,6 +51028,498 @@
                                         </p:cTn>
                                         <p:tgtEl>
                                           <p:spTgt spid="43"/>
+                                        </p:tgtEl>
+                                        <p:attrNameLst>
+                                          <p:attrName>style.visibility</p:attrName>
+                                        </p:attrNameLst>
+                                      </p:cBhvr>
+                                      <p:to>
+                                        <p:strVal val="visible"/>
+                                      </p:to>
+                                    </p:set>
+                                  </p:childTnLst>
+                                </p:cTn>
+                              </p:par>
+                            </p:childTnLst>
+                          </p:cTn>
+                        </p:par>
+                      </p:childTnLst>
+                    </p:cTn>
+                  </p:par>
+                </p:childTnLst>
+              </p:cTn>
+              <p:prevCondLst>
+                <p:cond evt="onPrev" delay="0">
+                  <p:tgtEl>
+                    <p:sldTgt/>
+                  </p:tgtEl>
+                </p:cond>
+              </p:prevCondLst>
+              <p:nextCondLst>
+                <p:cond evt="onNext" delay="0">
+                  <p:tgtEl>
+                    <p:sldTgt/>
+                  </p:tgtEl>
+                </p:cond>
+              </p:nextCondLst>
+            </p:seq>
+          </p:childTnLst>
+        </p:cTn>
+      </p:par>
+    </p:tnLst>
+  </p:timing>
+</p:sld>
+</file>
+
+<file path=ppt/slides/slide27.xml><?xml version="1.0" encoding="utf-8"?>
+<p:sld xmlns:a="http://schemas.openxmlformats.org/drawingml/2006/main" xmlns:r="http://schemas.openxmlformats.org/officeDocument/2006/relationships" xmlns:p="http://schemas.openxmlformats.org/presentationml/2006/main">
+  <p:cSld>
+    <p:spTree>
+      <p:nvGrpSpPr>
+        <p:cNvPr id="1" name=""/>
+        <p:cNvGrpSpPr/>
+        <p:nvPr/>
+      </p:nvGrpSpPr>
+      <p:grpSpPr>
+        <a:xfrm>
+          <a:off x="0" y="0"/>
+          <a:ext cx="0" cy="0"/>
+          <a:chOff x="0" y="0"/>
+          <a:chExt cx="0" cy="0"/>
+        </a:xfrm>
+      </p:grpSpPr>
+      <p:sp>
+        <p:nvSpPr>
+          <p:cNvPr id="2" name="Title 1"/>
+          <p:cNvSpPr>
+            <a:spLocks noGrp="1"/>
+          </p:cNvSpPr>
+          <p:nvPr>
+            <p:ph type="title"/>
+          </p:nvPr>
+        </p:nvSpPr>
+        <p:spPr/>
+        <p:txBody>
+          <a:bodyPr/>
+          <a:lstStyle/>
+          <a:p>
+            <a:r>
+              <a:rPr lang="en-US" dirty="0" smtClean="0"/>
+              <a:t>What have we learned?</a:t>
+            </a:r>
+            <a:endParaRPr lang="en-US" dirty="0"/>
+          </a:p>
+        </p:txBody>
+      </p:sp>
+      <p:sp>
+        <p:nvSpPr>
+          <p:cNvPr id="3" name="Content Placeholder 2"/>
+          <p:cNvSpPr>
+            <a:spLocks noGrp="1"/>
+          </p:cNvSpPr>
+          <p:nvPr>
+            <p:ph idx="1"/>
+          </p:nvPr>
+        </p:nvSpPr>
+        <p:spPr/>
+        <p:txBody>
+          <a:bodyPr/>
+          <a:lstStyle/>
+          <a:p>
+            <a:r>
+              <a:rPr lang="en-US" dirty="0" smtClean="0"/>
+              <a:t>Data Visualization</a:t>
+            </a:r>
+          </a:p>
+          <a:p>
+            <a:pPr lvl="1"/>
+            <a:r>
+              <a:rPr lang="en-US" dirty="0" smtClean="0"/>
+              <a:t>Picking the proper tool requires understanding the issues at hand</a:t>
+            </a:r>
+          </a:p>
+          <a:p>
+            <a:pPr lvl="1"/>
+            <a:r>
+              <a:rPr lang="en-US" dirty="0" smtClean="0"/>
+              <a:t>ggplot2 is an excellent package for static mapping &amp; foundational understanding of visualization</a:t>
+            </a:r>
+          </a:p>
+          <a:p>
+            <a:r>
+              <a:rPr lang="en-US" dirty="0" smtClean="0"/>
+              <a:t>Workflow</a:t>
+            </a:r>
+          </a:p>
+          <a:p>
+            <a:pPr lvl="1"/>
+            <a:r>
+              <a:rPr lang="en-US" dirty="0" smtClean="0"/>
+              <a:t>Picking the proper code structure requires understanding the issues at hand</a:t>
+            </a:r>
+          </a:p>
+          <a:p>
+            <a:pPr lvl="1"/>
+            <a:r>
+              <a:rPr lang="en-US" dirty="0" smtClean="0"/>
+              <a:t>The more comfortable you get with different, code architectures, the cleaner, faster, and more interpretable your code will be</a:t>
+            </a:r>
+          </a:p>
+          <a:p>
+            <a:r>
+              <a:rPr lang="en-US" dirty="0" smtClean="0"/>
+              <a:t>Thank you! Questions? </a:t>
+            </a:r>
+          </a:p>
+          <a:p>
+            <a:pPr lvl="1"/>
+            <a:endParaRPr lang="en-US" dirty="0"/>
+          </a:p>
+        </p:txBody>
+      </p:sp>
+    </p:spTree>
+    <p:extLst>
+      <p:ext uri="{BB962C8B-B14F-4D97-AF65-F5344CB8AC3E}">
+        <p14:creationId xmlns:p14="http://schemas.microsoft.com/office/powerpoint/2010/main" val="1781072048"/>
+      </p:ext>
+    </p:extLst>
+  </p:cSld>
+  <p:clrMapOvr>
+    <a:masterClrMapping/>
+  </p:clrMapOvr>
+  <p:timing>
+    <p:tnLst>
+      <p:par>
+        <p:cTn id="1" dur="indefinite" restart="never" nodeType="tmRoot">
+          <p:childTnLst>
+            <p:seq concurrent="1" nextAc="seek">
+              <p:cTn id="2" dur="indefinite" nodeType="mainSeq">
+                <p:childTnLst>
+                  <p:par>
+                    <p:cTn id="3" fill="hold">
+                      <p:stCondLst>
+                        <p:cond delay="indefinite"/>
+                      </p:stCondLst>
+                      <p:childTnLst>
+                        <p:par>
+                          <p:cTn id="4" fill="hold">
+                            <p:stCondLst>
+                              <p:cond delay="0"/>
+                            </p:stCondLst>
+                            <p:childTnLst>
+                              <p:par>
+                                <p:cTn id="5" presetID="1" presetClass="entr" presetSubtype="0" fill="hold" nodeType="clickEffect">
+                                  <p:stCondLst>
+                                    <p:cond delay="0"/>
+                                  </p:stCondLst>
+                                  <p:childTnLst>
+                                    <p:set>
+                                      <p:cBhvr>
+                                        <p:cTn id="6" dur="1" fill="hold">
+                                          <p:stCondLst>
+                                            <p:cond delay="0"/>
+                                          </p:stCondLst>
+                                        </p:cTn>
+                                        <p:tgtEl>
+                                          <p:spTgt spid="3">
+                                            <p:txEl>
+                                              <p:pRg st="0" end="0"/>
+                                            </p:txEl>
+                                          </p:spTgt>
+                                        </p:tgtEl>
+                                        <p:attrNameLst>
+                                          <p:attrName>style.visibility</p:attrName>
+                                        </p:attrNameLst>
+                                      </p:cBhvr>
+                                      <p:to>
+                                        <p:strVal val="visible"/>
+                                      </p:to>
+                                    </p:set>
+                                  </p:childTnLst>
+                                </p:cTn>
+                              </p:par>
+                            </p:childTnLst>
+                          </p:cTn>
+                        </p:par>
+                      </p:childTnLst>
+                    </p:cTn>
+                  </p:par>
+                  <p:par>
+                    <p:cTn id="7" fill="hold">
+                      <p:stCondLst>
+                        <p:cond delay="indefinite"/>
+                      </p:stCondLst>
+                      <p:childTnLst>
+                        <p:par>
+                          <p:cTn id="8" fill="hold">
+                            <p:stCondLst>
+                              <p:cond delay="0"/>
+                            </p:stCondLst>
+                            <p:childTnLst>
+                              <p:par>
+                                <p:cTn id="9" presetID="1" presetClass="entr" presetSubtype="0" fill="hold" nodeType="clickEffect">
+                                  <p:stCondLst>
+                                    <p:cond delay="0"/>
+                                  </p:stCondLst>
+                                  <p:childTnLst>
+                                    <p:set>
+                                      <p:cBhvr>
+                                        <p:cTn id="10" dur="1" fill="hold">
+                                          <p:stCondLst>
+                                            <p:cond delay="0"/>
+                                          </p:stCondLst>
+                                        </p:cTn>
+                                        <p:tgtEl>
+                                          <p:spTgt spid="3">
+                                            <p:txEl>
+                                              <p:pRg st="1" end="1"/>
+                                            </p:txEl>
+                                          </p:spTgt>
+                                        </p:tgtEl>
+                                        <p:attrNameLst>
+                                          <p:attrName>style.visibility</p:attrName>
+                                        </p:attrNameLst>
+                                      </p:cBhvr>
+                                      <p:to>
+                                        <p:strVal val="visible"/>
+                                      </p:to>
+                                    </p:set>
+                                  </p:childTnLst>
+                                </p:cTn>
+                              </p:par>
+                            </p:childTnLst>
+                          </p:cTn>
+                        </p:par>
+                      </p:childTnLst>
+                    </p:cTn>
+                  </p:par>
+                  <p:par>
+                    <p:cTn id="11" fill="hold">
+                      <p:stCondLst>
+                        <p:cond delay="indefinite"/>
+                      </p:stCondLst>
+                      <p:childTnLst>
+                        <p:par>
+                          <p:cTn id="12" fill="hold">
+                            <p:stCondLst>
+                              <p:cond delay="0"/>
+                            </p:stCondLst>
+                            <p:childTnLst>
+                              <p:par>
+                                <p:cTn id="13" presetID="1" presetClass="entr" presetSubtype="0" fill="hold" nodeType="clickEffect">
+                                  <p:stCondLst>
+                                    <p:cond delay="0"/>
+                                  </p:stCondLst>
+                                  <p:childTnLst>
+                                    <p:set>
+                                      <p:cBhvr>
+                                        <p:cTn id="14" dur="1" fill="hold">
+                                          <p:stCondLst>
+                                            <p:cond delay="0"/>
+                                          </p:stCondLst>
+                                        </p:cTn>
+                                        <p:tgtEl>
+                                          <p:spTgt spid="3">
+                                            <p:txEl>
+                                              <p:pRg st="2" end="2"/>
+                                            </p:txEl>
+                                          </p:spTgt>
+                                        </p:tgtEl>
+                                        <p:attrNameLst>
+                                          <p:attrName>style.visibility</p:attrName>
+                                        </p:attrNameLst>
+                                      </p:cBhvr>
+                                      <p:to>
+                                        <p:strVal val="visible"/>
+                                      </p:to>
+                                    </p:set>
+                                  </p:childTnLst>
+                                </p:cTn>
+                              </p:par>
+                            </p:childTnLst>
+                          </p:cTn>
+                        </p:par>
+                      </p:childTnLst>
+                    </p:cTn>
+                  </p:par>
+                  <p:par>
+                    <p:cTn id="15" fill="hold">
+                      <p:stCondLst>
+                        <p:cond delay="indefinite"/>
+                      </p:stCondLst>
+                      <p:childTnLst>
+                        <p:par>
+                          <p:cTn id="16" fill="hold">
+                            <p:stCondLst>
+                              <p:cond delay="0"/>
+                            </p:stCondLst>
+                            <p:childTnLst>
+                              <p:par>
+                                <p:cTn id="17" presetID="1" presetClass="entr" presetSubtype="0" fill="hold" nodeType="clickEffect">
+                                  <p:stCondLst>
+                                    <p:cond delay="0"/>
+                                  </p:stCondLst>
+                                  <p:childTnLst>
+                                    <p:set>
+                                      <p:cBhvr>
+                                        <p:cTn id="18" dur="1" fill="hold">
+                                          <p:stCondLst>
+                                            <p:cond delay="0"/>
+                                          </p:stCondLst>
+                                        </p:cTn>
+                                        <p:tgtEl>
+                                          <p:spTgt spid="3">
+                                            <p:txEl>
+                                              <p:pRg st="3" end="3"/>
+                                            </p:txEl>
+                                          </p:spTgt>
+                                        </p:tgtEl>
+                                        <p:attrNameLst>
+                                          <p:attrName>style.visibility</p:attrName>
+                                        </p:attrNameLst>
+                                      </p:cBhvr>
+                                      <p:to>
+                                        <p:strVal val="visible"/>
+                                      </p:to>
+                                    </p:set>
+                                  </p:childTnLst>
+                                </p:cTn>
+                              </p:par>
+                            </p:childTnLst>
+                          </p:cTn>
+                        </p:par>
+                      </p:childTnLst>
+                    </p:cTn>
+                  </p:par>
+                  <p:par>
+                    <p:cTn id="19" fill="hold">
+                      <p:stCondLst>
+                        <p:cond delay="indefinite"/>
+                      </p:stCondLst>
+                      <p:childTnLst>
+                        <p:par>
+                          <p:cTn id="20" fill="hold">
+                            <p:stCondLst>
+                              <p:cond delay="0"/>
+                            </p:stCondLst>
+                            <p:childTnLst>
+                              <p:par>
+                                <p:cTn id="21" presetID="1" presetClass="entr" presetSubtype="0" fill="hold" nodeType="clickEffect">
+                                  <p:stCondLst>
+                                    <p:cond delay="0"/>
+                                  </p:stCondLst>
+                                  <p:childTnLst>
+                                    <p:set>
+                                      <p:cBhvr>
+                                        <p:cTn id="22" dur="1" fill="hold">
+                                          <p:stCondLst>
+                                            <p:cond delay="0"/>
+                                          </p:stCondLst>
+                                        </p:cTn>
+                                        <p:tgtEl>
+                                          <p:spTgt spid="3">
+                                            <p:txEl>
+                                              <p:pRg st="4" end="4"/>
+                                            </p:txEl>
+                                          </p:spTgt>
+                                        </p:tgtEl>
+                                        <p:attrNameLst>
+                                          <p:attrName>style.visibility</p:attrName>
+                                        </p:attrNameLst>
+                                      </p:cBhvr>
+                                      <p:to>
+                                        <p:strVal val="visible"/>
+                                      </p:to>
+                                    </p:set>
+                                  </p:childTnLst>
+                                </p:cTn>
+                              </p:par>
+                            </p:childTnLst>
+                          </p:cTn>
+                        </p:par>
+                      </p:childTnLst>
+                    </p:cTn>
+                  </p:par>
+                  <p:par>
+                    <p:cTn id="23" fill="hold">
+                      <p:stCondLst>
+                        <p:cond delay="indefinite"/>
+                      </p:stCondLst>
+                      <p:childTnLst>
+                        <p:par>
+                          <p:cTn id="24" fill="hold">
+                            <p:stCondLst>
+                              <p:cond delay="0"/>
+                            </p:stCondLst>
+                            <p:childTnLst>
+                              <p:par>
+                                <p:cTn id="25" presetID="1" presetClass="entr" presetSubtype="0" fill="hold" nodeType="clickEffect">
+                                  <p:stCondLst>
+                                    <p:cond delay="0"/>
+                                  </p:stCondLst>
+                                  <p:childTnLst>
+                                    <p:set>
+                                      <p:cBhvr>
+                                        <p:cTn id="26" dur="1" fill="hold">
+                                          <p:stCondLst>
+                                            <p:cond delay="0"/>
+                                          </p:stCondLst>
+                                        </p:cTn>
+                                        <p:tgtEl>
+                                          <p:spTgt spid="3">
+                                            <p:txEl>
+                                              <p:pRg st="5" end="5"/>
+                                            </p:txEl>
+                                          </p:spTgt>
+                                        </p:tgtEl>
+                                        <p:attrNameLst>
+                                          <p:attrName>style.visibility</p:attrName>
+                                        </p:attrNameLst>
+                                      </p:cBhvr>
+                                      <p:to>
+                                        <p:strVal val="visible"/>
+                                      </p:to>
+                                    </p:set>
+                                  </p:childTnLst>
+                                </p:cTn>
+                              </p:par>
+                            </p:childTnLst>
+                          </p:cTn>
+                        </p:par>
+                      </p:childTnLst>
+                    </p:cTn>
+                  </p:par>
+                  <p:par>
+                    <p:cTn id="27" fill="hold">
+                      <p:stCondLst>
+                        <p:cond delay="indefinite"/>
+                      </p:stCondLst>
+                      <p:childTnLst>
+                        <p:par>
+                          <p:cTn id="28" fill="hold">
+                            <p:stCondLst>
+                              <p:cond delay="0"/>
+                            </p:stCondLst>
+                            <p:childTnLst>
+                              <p:par>
+                                <p:cTn id="29" presetID="1" presetClass="entr" presetSubtype="0" fill="hold" nodeType="clickEffect">
+                                  <p:stCondLst>
+                                    <p:cond delay="0"/>
+                                  </p:stCondLst>
+                                  <p:childTnLst>
+                                    <p:set>
+                                      <p:cBhvr>
+                                        <p:cTn id="30" dur="1" fill="hold">
+                                          <p:stCondLst>
+                                            <p:cond delay="0"/>
+                                          </p:stCondLst>
+                                        </p:cTn>
+                                        <p:tgtEl>
+                                          <p:spTgt spid="3">
+                                            <p:txEl>
+                                              <p:pRg st="6" end="6"/>
+                                            </p:txEl>
+                                          </p:spTgt>
                                         </p:tgtEl>
                                         <p:attrNameLst>
                                           <p:attrName>style.visibility</p:attrName>

</xml_diff>

<commit_message>
add shell script, clarify titles for powerpoint
</commit_message>
<xml_diff>
--- a/class_3_4.pptx
+++ b/class_3_4.pptx
@@ -908,11 +908,11 @@
           <c:showPercent val="0"/>
           <c:showBubbleSize val="0"/>
         </c:dLbls>
-        <c:axId val="-1424680032"/>
-        <c:axId val="-1212337728"/>
+        <c:axId val="-6827296"/>
+        <c:axId val="-6826752"/>
       </c:scatterChart>
       <c:valAx>
-        <c:axId val="-1424680032"/>
+        <c:axId val="-6827296"/>
         <c:scaling>
           <c:orientation val="minMax"/>
         </c:scaling>
@@ -969,12 +969,12 @@
             <a:endParaRPr lang="en-US"/>
           </a:p>
         </c:txPr>
-        <c:crossAx val="-1212337728"/>
+        <c:crossAx val="-6826752"/>
         <c:crosses val="autoZero"/>
         <c:crossBetween val="midCat"/>
       </c:valAx>
       <c:valAx>
-        <c:axId val="-1212337728"/>
+        <c:axId val="-6826752"/>
         <c:scaling>
           <c:orientation val="minMax"/>
         </c:scaling>
@@ -1031,7 +1031,7 @@
             <a:endParaRPr lang="en-US"/>
           </a:p>
         </c:txPr>
-        <c:crossAx val="-1424680032"/>
+        <c:crossAx val="-6827296"/>
         <c:crosses val="autoZero"/>
         <c:crossBetween val="midCat"/>
       </c:valAx>
@@ -1740,7 +1740,7 @@
           <a:p>
             <a:fld id="{D321804F-8474-4B3C-BEC9-4B8B6CCBA09E}" type="datetimeFigureOut">
               <a:rPr lang="en-US" smtClean="0"/>
-              <a:t>3/2/2016</a:t>
+              <a:t>3/3/2016</a:t>
             </a:fld>
             <a:endParaRPr lang="en-US"/>
           </a:p>
@@ -2058,11 +2058,7 @@
             </a:r>
             <a:r>
               <a:rPr lang="en-US" baseline="0" dirty="0" smtClean="0"/>
-              <a:t> who I am, my </a:t>
-            </a:r>
-            <a:r>
-              <a:rPr lang="en-US" baseline="0" dirty="0" smtClean="0"/>
-              <a:t>interests, background, current role</a:t>
+              <a:t> who I am, my interests, background, current role</a:t>
             </a:r>
           </a:p>
           <a:p>
@@ -2083,6 +2079,15 @@
               <a:t>viz</a:t>
             </a:r>
             <a:endParaRPr lang="en-US" baseline="0" dirty="0" smtClean="0"/>
+          </a:p>
+          <a:p>
+            <a:endParaRPr lang="en-US" baseline="0" dirty="0" smtClean="0"/>
+          </a:p>
+          <a:p>
+            <a:r>
+              <a:rPr lang="en-US" baseline="0" dirty="0" smtClean="0"/>
+              <a:t>--mortality: how to address it</a:t>
+            </a:r>
           </a:p>
           <a:p>
             <a:endParaRPr lang="en-US" baseline="0" dirty="0" smtClean="0"/>
@@ -2891,19 +2896,7 @@
           <a:p>
             <a:r>
               <a:rPr lang="en-US" baseline="0" dirty="0" smtClean="0"/>
-              <a:t>Actually even better than that: you just tell the </a:t>
-            </a:r>
-            <a:r>
-              <a:rPr lang="en-US" baseline="0" dirty="0" smtClean="0"/>
-              <a:t>group </a:t>
-            </a:r>
-            <a:r>
-              <a:rPr lang="en-US" baseline="0" dirty="0" smtClean="0"/>
-              <a:t>of computers what you want done, and they arrange </a:t>
-            </a:r>
-            <a:r>
-              <a:rPr lang="en-US" baseline="0" dirty="0" smtClean="0"/>
-              <a:t>themselves</a:t>
+              <a:t>Actually even better than that: you just tell the group of computers what you want done, and they arrange themselves</a:t>
             </a:r>
           </a:p>
           <a:p>
@@ -4056,7 +4049,7 @@
           <a:p>
             <a:fld id="{A5C42B43-71C5-4126-819D-B934AB90E139}" type="datetimeFigureOut">
               <a:rPr lang="en-US" smtClean="0"/>
-              <a:t>3/2/2016</a:t>
+              <a:t>3/3/2016</a:t>
             </a:fld>
             <a:endParaRPr lang="en-US"/>
           </a:p>
@@ -4226,7 +4219,7 @@
           <a:p>
             <a:fld id="{A5C42B43-71C5-4126-819D-B934AB90E139}" type="datetimeFigureOut">
               <a:rPr lang="en-US" smtClean="0"/>
-              <a:t>3/2/2016</a:t>
+              <a:t>3/3/2016</a:t>
             </a:fld>
             <a:endParaRPr lang="en-US"/>
           </a:p>
@@ -4406,7 +4399,7 @@
           <a:p>
             <a:fld id="{A5C42B43-71C5-4126-819D-B934AB90E139}" type="datetimeFigureOut">
               <a:rPr lang="en-US" smtClean="0"/>
-              <a:t>3/2/2016</a:t>
+              <a:t>3/3/2016</a:t>
             </a:fld>
             <a:endParaRPr lang="en-US"/>
           </a:p>
@@ -4576,7 +4569,7 @@
           <a:p>
             <a:fld id="{A5C42B43-71C5-4126-819D-B934AB90E139}" type="datetimeFigureOut">
               <a:rPr lang="en-US" smtClean="0"/>
-              <a:t>3/2/2016</a:t>
+              <a:t>3/3/2016</a:t>
             </a:fld>
             <a:endParaRPr lang="en-US"/>
           </a:p>
@@ -4822,7 +4815,7 @@
           <a:p>
             <a:fld id="{A5C42B43-71C5-4126-819D-B934AB90E139}" type="datetimeFigureOut">
               <a:rPr lang="en-US" smtClean="0"/>
-              <a:t>3/2/2016</a:t>
+              <a:t>3/3/2016</a:t>
             </a:fld>
             <a:endParaRPr lang="en-US"/>
           </a:p>
@@ -5054,7 +5047,7 @@
           <a:p>
             <a:fld id="{A5C42B43-71C5-4126-819D-B934AB90E139}" type="datetimeFigureOut">
               <a:rPr lang="en-US" smtClean="0"/>
-              <a:t>3/2/2016</a:t>
+              <a:t>3/3/2016</a:t>
             </a:fld>
             <a:endParaRPr lang="en-US"/>
           </a:p>
@@ -5421,7 +5414,7 @@
           <a:p>
             <a:fld id="{A5C42B43-71C5-4126-819D-B934AB90E139}" type="datetimeFigureOut">
               <a:rPr lang="en-US" smtClean="0"/>
-              <a:t>3/2/2016</a:t>
+              <a:t>3/3/2016</a:t>
             </a:fld>
             <a:endParaRPr lang="en-US"/>
           </a:p>
@@ -5539,7 +5532,7 @@
           <a:p>
             <a:fld id="{A5C42B43-71C5-4126-819D-B934AB90E139}" type="datetimeFigureOut">
               <a:rPr lang="en-US" smtClean="0"/>
-              <a:t>3/2/2016</a:t>
+              <a:t>3/3/2016</a:t>
             </a:fld>
             <a:endParaRPr lang="en-US"/>
           </a:p>
@@ -5634,7 +5627,7 @@
           <a:p>
             <a:fld id="{A5C42B43-71C5-4126-819D-B934AB90E139}" type="datetimeFigureOut">
               <a:rPr lang="en-US" smtClean="0"/>
-              <a:t>3/2/2016</a:t>
+              <a:t>3/3/2016</a:t>
             </a:fld>
             <a:endParaRPr lang="en-US"/>
           </a:p>
@@ -5911,7 +5904,7 @@
           <a:p>
             <a:fld id="{A5C42B43-71C5-4126-819D-B934AB90E139}" type="datetimeFigureOut">
               <a:rPr lang="en-US" smtClean="0"/>
-              <a:t>3/2/2016</a:t>
+              <a:t>3/3/2016</a:t>
             </a:fld>
             <a:endParaRPr lang="en-US"/>
           </a:p>
@@ -6164,7 +6157,7 @@
           <a:p>
             <a:fld id="{A5C42B43-71C5-4126-819D-B934AB90E139}" type="datetimeFigureOut">
               <a:rPr lang="en-US" smtClean="0"/>
-              <a:t>3/2/2016</a:t>
+              <a:t>3/3/2016</a:t>
             </a:fld>
             <a:endParaRPr lang="en-US"/>
           </a:p>
@@ -6377,7 +6370,7 @@
           <a:p>
             <a:fld id="{A5C42B43-71C5-4126-819D-B934AB90E139}" type="datetimeFigureOut">
               <a:rPr lang="en-US" smtClean="0"/>
-              <a:t>3/2/2016</a:t>
+              <a:t>3/3/2016</a:t>
             </a:fld>
             <a:endParaRPr lang="en-US"/>
           </a:p>
@@ -8438,16 +8431,11 @@
               <a:rPr lang="en-US" dirty="0" smtClean="0"/>
               <a:t>Parallelized</a:t>
             </a:r>
-            <a:endParaRPr lang="en-US" dirty="0" smtClean="0"/>
           </a:p>
           <a:p>
             <a:r>
               <a:rPr lang="en-US" dirty="0" smtClean="0"/>
-              <a:t>Real-life </a:t>
-            </a:r>
-            <a:r>
-              <a:rPr lang="en-US" dirty="0" smtClean="0"/>
-              <a:t>examples along the way</a:t>
+              <a:t>Real-life examples along the way</a:t>
             </a:r>
           </a:p>
           <a:p>
@@ -53212,7 +53200,7 @@
         </p:blipFill>
         <p:spPr>
           <a:xfrm>
-            <a:off x="1053068" y="905171"/>
+            <a:off x="951468" y="1538217"/>
             <a:ext cx="8885714" cy="4733333"/>
           </a:xfrm>
           <a:prstGeom prst="rect">
@@ -53236,7 +53224,7 @@
         </p:blipFill>
         <p:spPr>
           <a:xfrm>
-            <a:off x="1053068" y="714694"/>
+            <a:off x="951468" y="1347740"/>
             <a:ext cx="9314286" cy="5114286"/>
           </a:xfrm>
           <a:prstGeom prst="rect">
@@ -53244,6 +53232,34 @@
           </a:prstGeom>
         </p:spPr>
       </p:pic>
+      <p:sp>
+        <p:nvSpPr>
+          <p:cNvPr id="2" name="Title 1"/>
+          <p:cNvSpPr>
+            <a:spLocks noGrp="1"/>
+          </p:cNvSpPr>
+          <p:nvPr>
+            <p:ph type="title"/>
+          </p:nvPr>
+        </p:nvSpPr>
+        <p:spPr>
+          <a:xfrm>
+            <a:off x="838200" y="365125"/>
+            <a:ext cx="11103708" cy="1325563"/>
+          </a:xfrm>
+        </p:spPr>
+        <p:txBody>
+          <a:bodyPr/>
+          <a:lstStyle/>
+          <a:p>
+            <a:r>
+              <a:rPr lang="en-US" dirty="0" smtClean="0"/>
+              <a:t>The spectrum is about involvement, not beauty.</a:t>
+            </a:r>
+            <a:endParaRPr lang="en-US" dirty="0"/>
+          </a:p>
+        </p:txBody>
+      </p:sp>
     </p:spTree>
     <p:extLst>
       <p:ext uri="{BB962C8B-B14F-4D97-AF65-F5344CB8AC3E}">

</xml_diff>

<commit_message>
rename workflow folder, clarify ggplot exercise, touch up powerpoint
</commit_message>
<xml_diff>
--- a/class_3_4.pptx
+++ b/class_3_4.pptx
@@ -18,10 +18,10 @@
     <p:sldId id="267" r:id="rId9"/>
     <p:sldId id="266" r:id="rId10"/>
     <p:sldId id="260" r:id="rId11"/>
-    <p:sldId id="268" r:id="rId12"/>
-    <p:sldId id="269" r:id="rId13"/>
-    <p:sldId id="270" r:id="rId14"/>
-    <p:sldId id="292" r:id="rId15"/>
+    <p:sldId id="293" r:id="rId12"/>
+    <p:sldId id="268" r:id="rId13"/>
+    <p:sldId id="269" r:id="rId14"/>
+    <p:sldId id="270" r:id="rId15"/>
     <p:sldId id="271" r:id="rId16"/>
     <p:sldId id="274" r:id="rId17"/>
     <p:sldId id="284" r:id="rId18"/>
@@ -908,11 +908,11 @@
           <c:showPercent val="0"/>
           <c:showBubbleSize val="0"/>
         </c:dLbls>
-        <c:axId val="-6827296"/>
-        <c:axId val="-6826752"/>
+        <c:axId val="1804806256"/>
+        <c:axId val="1804803536"/>
       </c:scatterChart>
       <c:valAx>
-        <c:axId val="-6827296"/>
+        <c:axId val="1804806256"/>
         <c:scaling>
           <c:orientation val="minMax"/>
         </c:scaling>
@@ -969,12 +969,12 @@
             <a:endParaRPr lang="en-US"/>
           </a:p>
         </c:txPr>
-        <c:crossAx val="-6826752"/>
+        <c:crossAx val="1804803536"/>
         <c:crosses val="autoZero"/>
         <c:crossBetween val="midCat"/>
       </c:valAx>
       <c:valAx>
-        <c:axId val="-6826752"/>
+        <c:axId val="1804803536"/>
         <c:scaling>
           <c:orientation val="minMax"/>
         </c:scaling>
@@ -1031,7 +1031,7 @@
             <a:endParaRPr lang="en-US"/>
           </a:p>
         </c:txPr>
-        <c:crossAx val="-6827296"/>
+        <c:crossAx val="1804806256"/>
         <c:crosses val="autoZero"/>
         <c:crossBetween val="midCat"/>
       </c:valAx>
@@ -2303,11 +2303,17 @@
           <a:p>
             <a:r>
               <a:rPr lang="en-US" dirty="0" smtClean="0"/>
-              <a:t>Interested</a:t>
+              <a:t>Segue</a:t>
             </a:r>
             <a:r>
               <a:rPr lang="en-US" baseline="0" dirty="0" smtClean="0"/>
-              <a:t> in % of suicides committed by farmers: made this plot</a:t>
+              <a:t> into email exchange with Rakhi and Anil</a:t>
+            </a:r>
+          </a:p>
+          <a:p>
+            <a:r>
+              <a:rPr lang="en-US" baseline="0" dirty="0" smtClean="0"/>
+              <a:t>  </a:t>
             </a:r>
             <a:endParaRPr lang="en-US" dirty="0"/>
           </a:p>
@@ -2339,6 +2345,98 @@
     </p:spTree>
     <p:extLst>
       <p:ext uri="{BB962C8B-B14F-4D97-AF65-F5344CB8AC3E}">
+        <p14:creationId xmlns:p14="http://schemas.microsoft.com/office/powerpoint/2010/main" val="1915458054"/>
+      </p:ext>
+    </p:extLst>
+  </p:cSld>
+  <p:clrMapOvr>
+    <a:masterClrMapping/>
+  </p:clrMapOvr>
+</p:notes>
+</file>
+
+<file path=ppt/notesSlides/notesSlide11.xml><?xml version="1.0" encoding="utf-8"?>
+<p:notes xmlns:a="http://schemas.openxmlformats.org/drawingml/2006/main" xmlns:r="http://schemas.openxmlformats.org/officeDocument/2006/relationships" xmlns:p="http://schemas.openxmlformats.org/presentationml/2006/main">
+  <p:cSld>
+    <p:spTree>
+      <p:nvGrpSpPr>
+        <p:cNvPr id="1" name=""/>
+        <p:cNvGrpSpPr/>
+        <p:nvPr/>
+      </p:nvGrpSpPr>
+      <p:grpSpPr>
+        <a:xfrm>
+          <a:off x="0" y="0"/>
+          <a:ext cx="0" cy="0"/>
+          <a:chOff x="0" y="0"/>
+          <a:chExt cx="0" cy="0"/>
+        </a:xfrm>
+      </p:grpSpPr>
+      <p:sp>
+        <p:nvSpPr>
+          <p:cNvPr id="2" name="Slide Image Placeholder 1"/>
+          <p:cNvSpPr>
+            <a:spLocks noGrp="1" noRot="1" noChangeAspect="1"/>
+          </p:cNvSpPr>
+          <p:nvPr>
+            <p:ph type="sldImg"/>
+          </p:nvPr>
+        </p:nvSpPr>
+        <p:spPr/>
+      </p:sp>
+      <p:sp>
+        <p:nvSpPr>
+          <p:cNvPr id="3" name="Notes Placeholder 2"/>
+          <p:cNvSpPr>
+            <a:spLocks noGrp="1"/>
+          </p:cNvSpPr>
+          <p:nvPr>
+            <p:ph type="body" idx="1"/>
+          </p:nvPr>
+        </p:nvSpPr>
+        <p:spPr/>
+        <p:txBody>
+          <a:bodyPr/>
+          <a:lstStyle/>
+          <a:p>
+            <a:r>
+              <a:rPr lang="en-US" dirty="0" smtClean="0"/>
+              <a:t>Interested</a:t>
+            </a:r>
+            <a:r>
+              <a:rPr lang="en-US" baseline="0" dirty="0" smtClean="0"/>
+              <a:t> in % of suicides committed by farmers: made this plot</a:t>
+            </a:r>
+            <a:endParaRPr lang="en-US" dirty="0"/>
+          </a:p>
+        </p:txBody>
+      </p:sp>
+      <p:sp>
+        <p:nvSpPr>
+          <p:cNvPr id="4" name="Slide Number Placeholder 3"/>
+          <p:cNvSpPr>
+            <a:spLocks noGrp="1"/>
+          </p:cNvSpPr>
+          <p:nvPr>
+            <p:ph type="sldNum" sz="quarter" idx="10"/>
+          </p:nvPr>
+        </p:nvSpPr>
+        <p:spPr/>
+        <p:txBody>
+          <a:bodyPr/>
+          <a:lstStyle/>
+          <a:p>
+            <a:fld id="{D10C9AC4-446C-45D9-A8A8-E1DCCF98E2F5}" type="slidenum">
+              <a:rPr lang="en-US" smtClean="0"/>
+              <a:t>12</a:t>
+            </a:fld>
+            <a:endParaRPr lang="en-US"/>
+          </a:p>
+        </p:txBody>
+      </p:sp>
+    </p:spTree>
+    <p:extLst>
+      <p:ext uri="{BB962C8B-B14F-4D97-AF65-F5344CB8AC3E}">
         <p14:creationId xmlns:p14="http://schemas.microsoft.com/office/powerpoint/2010/main" val="4018133843"/>
       </p:ext>
     </p:extLst>
@@ -2349,7 +2447,7 @@
 </p:notes>
 </file>
 
-<file path=ppt/notesSlides/notesSlide11.xml><?xml version="1.0" encoding="utf-8"?>
+<file path=ppt/notesSlides/notesSlide12.xml><?xml version="1.0" encoding="utf-8"?>
 <p:notes xmlns:a="http://schemas.openxmlformats.org/drawingml/2006/main" xmlns:r="http://schemas.openxmlformats.org/officeDocument/2006/relationships" xmlns:p="http://schemas.openxmlformats.org/presentationml/2006/main">
   <p:cSld>
     <p:spTree>
@@ -2414,7 +2512,7 @@
           <a:p>
             <a:fld id="{D10C9AC4-446C-45D9-A8A8-E1DCCF98E2F5}" type="slidenum">
               <a:rPr lang="en-US" smtClean="0"/>
-              <a:t>12</a:t>
+              <a:t>13</a:t>
             </a:fld>
             <a:endParaRPr lang="en-US"/>
           </a:p>
@@ -2433,7 +2531,7 @@
 </p:notes>
 </file>
 
-<file path=ppt/notesSlides/notesSlide12.xml><?xml version="1.0" encoding="utf-8"?>
+<file path=ppt/notesSlides/notesSlide13.xml><?xml version="1.0" encoding="utf-8"?>
 <p:notes xmlns:a="http://schemas.openxmlformats.org/drawingml/2006/main" xmlns:r="http://schemas.openxmlformats.org/officeDocument/2006/relationships" xmlns:p="http://schemas.openxmlformats.org/presentationml/2006/main">
   <p:cSld>
     <p:spTree>
@@ -2548,7 +2646,7 @@
           <a:p>
             <a:fld id="{D10C9AC4-446C-45D9-A8A8-E1DCCF98E2F5}" type="slidenum">
               <a:rPr lang="en-US" smtClean="0"/>
-              <a:t>13</a:t>
+              <a:t>14</a:t>
             </a:fld>
             <a:endParaRPr lang="en-US"/>
           </a:p>
@@ -2558,100 +2656,6 @@
     <p:extLst>
       <p:ext uri="{BB962C8B-B14F-4D97-AF65-F5344CB8AC3E}">
         <p14:creationId xmlns:p14="http://schemas.microsoft.com/office/powerpoint/2010/main" val="2622684778"/>
-      </p:ext>
-    </p:extLst>
-  </p:cSld>
-  <p:clrMapOvr>
-    <a:masterClrMapping/>
-  </p:clrMapOvr>
-</p:notes>
-</file>
-
-<file path=ppt/notesSlides/notesSlide13.xml><?xml version="1.0" encoding="utf-8"?>
-<p:notes xmlns:a="http://schemas.openxmlformats.org/drawingml/2006/main" xmlns:r="http://schemas.openxmlformats.org/officeDocument/2006/relationships" xmlns:p="http://schemas.openxmlformats.org/presentationml/2006/main">
-  <p:cSld>
-    <p:spTree>
-      <p:nvGrpSpPr>
-        <p:cNvPr id="1" name=""/>
-        <p:cNvGrpSpPr/>
-        <p:nvPr/>
-      </p:nvGrpSpPr>
-      <p:grpSpPr>
-        <a:xfrm>
-          <a:off x="0" y="0"/>
-          <a:ext cx="0" cy="0"/>
-          <a:chOff x="0" y="0"/>
-          <a:chExt cx="0" cy="0"/>
-        </a:xfrm>
-      </p:grpSpPr>
-      <p:sp>
-        <p:nvSpPr>
-          <p:cNvPr id="2" name="Slide Image Placeholder 1"/>
-          <p:cNvSpPr>
-            <a:spLocks noGrp="1" noRot="1" noChangeAspect="1"/>
-          </p:cNvSpPr>
-          <p:nvPr>
-            <p:ph type="sldImg"/>
-          </p:nvPr>
-        </p:nvSpPr>
-        <p:spPr/>
-      </p:sp>
-      <p:sp>
-        <p:nvSpPr>
-          <p:cNvPr id="3" name="Notes Placeholder 2"/>
-          <p:cNvSpPr>
-            <a:spLocks noGrp="1"/>
-          </p:cNvSpPr>
-          <p:nvPr>
-            <p:ph type="body" idx="1"/>
-          </p:nvPr>
-        </p:nvSpPr>
-        <p:spPr/>
-        <p:txBody>
-          <a:bodyPr/>
-          <a:lstStyle/>
-          <a:p>
-            <a:r>
-              <a:rPr lang="en-US" dirty="0" smtClean="0"/>
-              <a:t>Another example: last Wednesday</a:t>
-            </a:r>
-          </a:p>
-          <a:p>
-            <a:r>
-              <a:rPr lang="en-US" dirty="0" smtClean="0"/>
-              <a:t>See: https://trello.com/c/GnNou0pw/333-garbage-redistribution-figures-for-howard-bauchner-presentation</a:t>
-            </a:r>
-            <a:endParaRPr lang="en-US" dirty="0"/>
-          </a:p>
-        </p:txBody>
-      </p:sp>
-      <p:sp>
-        <p:nvSpPr>
-          <p:cNvPr id="4" name="Slide Number Placeholder 3"/>
-          <p:cNvSpPr>
-            <a:spLocks noGrp="1"/>
-          </p:cNvSpPr>
-          <p:nvPr>
-            <p:ph type="sldNum" sz="quarter" idx="10"/>
-          </p:nvPr>
-        </p:nvSpPr>
-        <p:spPr/>
-        <p:txBody>
-          <a:bodyPr/>
-          <a:lstStyle/>
-          <a:p>
-            <a:fld id="{D10C9AC4-446C-45D9-A8A8-E1DCCF98E2F5}" type="slidenum">
-              <a:rPr lang="en-US" smtClean="0"/>
-              <a:t>14</a:t>
-            </a:fld>
-            <a:endParaRPr lang="en-US"/>
-          </a:p>
-        </p:txBody>
-      </p:sp>
-    </p:spTree>
-    <p:extLst>
-      <p:ext uri="{BB962C8B-B14F-4D97-AF65-F5344CB8AC3E}">
-        <p14:creationId xmlns:p14="http://schemas.microsoft.com/office/powerpoint/2010/main" val="3434934148"/>
       </p:ext>
     </p:extLst>
   </p:cSld>
@@ -3260,15 +3264,7 @@
           <a:p>
             <a:r>
               <a:rPr lang="en-US" baseline="0" dirty="0" smtClean="0"/>
-              <a:t>“If you want to bake an apple pie from scratch</a:t>
-            </a:r>
-            <a:r>
-              <a:rPr lang="en-US" baseline="0" smtClean="0"/>
-              <a:t>, you must </a:t>
-            </a:r>
-            <a:r>
-              <a:rPr lang="en-US" baseline="0" dirty="0" smtClean="0"/>
-              <a:t>first invent the universe”</a:t>
+              <a:t>“If you want to bake an apple pie from scratch, you must first invent the universe”</a:t>
             </a:r>
           </a:p>
           <a:p>
@@ -7183,7 +7179,11 @@
             </a:pPr>
             <a:r>
               <a:rPr lang="en-US" dirty="0" smtClean="0"/>
-              <a:t>Why static?</a:t>
+              <a:t>Why static</a:t>
+            </a:r>
+            <a:r>
+              <a:rPr lang="en-US" dirty="0" smtClean="0"/>
+              <a:t>?</a:t>
             </a:r>
           </a:p>
           <a:p>
@@ -7194,8 +7194,9 @@
             </a:pPr>
             <a:r>
               <a:rPr lang="en-US" dirty="0" smtClean="0"/>
-              <a:t>Standard for publications &amp; communications</a:t>
+              <a:t>Printed documents</a:t>
             </a:r>
+            <a:endParaRPr lang="en-US" dirty="0" smtClean="0"/>
           </a:p>
           <a:p>
             <a:pPr lvl="1">
@@ -7205,7 +7206,11 @@
             </a:pPr>
             <a:r>
               <a:rPr lang="en-US" dirty="0" smtClean="0"/>
-              <a:t>Foundation for interactive visualization</a:t>
+              <a:t>Foundation </a:t>
+            </a:r>
+            <a:r>
+              <a:rPr lang="en-US" dirty="0" smtClean="0"/>
+              <a:t>for interactive visualization</a:t>
             </a:r>
           </a:p>
           <a:p>
@@ -7218,56 +7223,7 @@
               <a:rPr lang="en-US" b="1" dirty="0" smtClean="0"/>
               <a:t>You can’t make a good interactive plot if you can’t make a good static plot.</a:t>
             </a:r>
-            <a:endParaRPr lang="en-US" dirty="0"/>
-          </a:p>
-          <a:p>
-            <a:pPr marL="0" indent="0">
-              <a:lnSpc>
-                <a:spcPct val="100000"/>
-              </a:lnSpc>
-              <a:buNone/>
-            </a:pPr>
-            <a:r>
-              <a:rPr lang="en-US" dirty="0" err="1" smtClean="0"/>
-              <a:t>ggplot</a:t>
-            </a:r>
-            <a:r>
-              <a:rPr lang="en-US" dirty="0" smtClean="0"/>
-              <a:t> helps you make good static plots:</a:t>
-            </a:r>
-          </a:p>
-          <a:p>
-            <a:pPr lvl="1">
-              <a:lnSpc>
-                <a:spcPct val="100000"/>
-              </a:lnSpc>
-            </a:pPr>
-            <a:r>
-              <a:rPr lang="en-US" dirty="0" smtClean="0"/>
-              <a:t>Standard aesthetic properties (aka: pretty)</a:t>
-            </a:r>
-          </a:p>
-          <a:p>
-            <a:pPr lvl="1">
-              <a:lnSpc>
-                <a:spcPct val="100000"/>
-              </a:lnSpc>
-            </a:pPr>
-            <a:r>
-              <a:rPr lang="en-US" dirty="0" smtClean="0"/>
-              <a:t>Highly customizable</a:t>
-            </a:r>
-          </a:p>
-          <a:p>
-            <a:pPr lvl="1">
-              <a:lnSpc>
-                <a:spcPct val="100000"/>
-              </a:lnSpc>
-            </a:pPr>
-            <a:r>
-              <a:rPr lang="en-US" dirty="0" smtClean="0"/>
-              <a:t>Great documentation/online community</a:t>
-            </a:r>
+            <a:endParaRPr lang="en-US" dirty="0" smtClean="0"/>
           </a:p>
         </p:txBody>
       </p:sp>
@@ -7485,27 +7441,184 @@
                       </p:childTnLst>
                     </p:cTn>
                   </p:par>
+                </p:childTnLst>
+              </p:cTn>
+              <p:prevCondLst>
+                <p:cond evt="onPrev" delay="0">
+                  <p:tgtEl>
+                    <p:sldTgt/>
+                  </p:tgtEl>
+                </p:cond>
+              </p:prevCondLst>
+              <p:nextCondLst>
+                <p:cond evt="onNext" delay="0">
+                  <p:tgtEl>
+                    <p:sldTgt/>
+                  </p:tgtEl>
+                </p:cond>
+              </p:nextCondLst>
+            </p:seq>
+          </p:childTnLst>
+        </p:cTn>
+      </p:par>
+    </p:tnLst>
+  </p:timing>
+</p:sld>
+</file>
+
+<file path=ppt/slides/slide11.xml><?xml version="1.0" encoding="utf-8"?>
+<p:sld xmlns:a="http://schemas.openxmlformats.org/drawingml/2006/main" xmlns:r="http://schemas.openxmlformats.org/officeDocument/2006/relationships" xmlns:p="http://schemas.openxmlformats.org/presentationml/2006/main">
+  <p:cSld>
+    <p:spTree>
+      <p:nvGrpSpPr>
+        <p:cNvPr id="1" name=""/>
+        <p:cNvGrpSpPr/>
+        <p:nvPr/>
+      </p:nvGrpSpPr>
+      <p:grpSpPr>
+        <a:xfrm>
+          <a:off x="0" y="0"/>
+          <a:ext cx="0" cy="0"/>
+          <a:chOff x="0" y="0"/>
+          <a:chExt cx="0" cy="0"/>
+        </a:xfrm>
+      </p:grpSpPr>
+      <p:sp>
+        <p:nvSpPr>
+          <p:cNvPr id="2" name="Title 1"/>
+          <p:cNvSpPr>
+            <a:spLocks noGrp="1"/>
+          </p:cNvSpPr>
+          <p:nvPr>
+            <p:ph type="title"/>
+          </p:nvPr>
+        </p:nvSpPr>
+        <p:spPr/>
+        <p:txBody>
+          <a:bodyPr/>
+          <a:lstStyle/>
+          <a:p>
+            <a:pPr>
+              <a:lnSpc>
+                <a:spcPct val="100000"/>
+              </a:lnSpc>
+            </a:pPr>
+            <a:r>
+              <a:rPr lang="en-US" dirty="0" err="1"/>
+              <a:t>ggplot</a:t>
+            </a:r>
+            <a:r>
+              <a:rPr lang="en-US" dirty="0"/>
+              <a:t> helps you make good static </a:t>
+            </a:r>
+            <a:r>
+              <a:rPr lang="en-US" dirty="0" smtClean="0"/>
+              <a:t>plots</a:t>
+            </a:r>
+            <a:endParaRPr lang="en-US" dirty="0"/>
+          </a:p>
+        </p:txBody>
+      </p:sp>
+      <p:sp>
+        <p:nvSpPr>
+          <p:cNvPr id="3" name="Content Placeholder 2"/>
+          <p:cNvSpPr>
+            <a:spLocks noGrp="1"/>
+          </p:cNvSpPr>
+          <p:nvPr>
+            <p:ph idx="1"/>
+          </p:nvPr>
+        </p:nvSpPr>
+        <p:spPr>
+          <a:xfrm>
+            <a:off x="838200" y="1690688"/>
+            <a:ext cx="10759068" cy="4717546"/>
+          </a:xfrm>
+        </p:spPr>
+        <p:txBody>
+          <a:bodyPr>
+            <a:normAutofit/>
+          </a:bodyPr>
+          <a:lstStyle/>
+          <a:p>
+            <a:pPr>
+              <a:lnSpc>
+                <a:spcPct val="100000"/>
+              </a:lnSpc>
+            </a:pPr>
+            <a:r>
+              <a:rPr lang="en-US" dirty="0" smtClean="0"/>
+              <a:t>Standard </a:t>
+            </a:r>
+            <a:r>
+              <a:rPr lang="en-US" dirty="0" smtClean="0"/>
+              <a:t>aesthetic properties (aka: pretty)</a:t>
+            </a:r>
+          </a:p>
+          <a:p>
+            <a:pPr>
+              <a:lnSpc>
+                <a:spcPct val="100000"/>
+              </a:lnSpc>
+            </a:pPr>
+            <a:r>
+              <a:rPr lang="en-US" dirty="0" smtClean="0"/>
+              <a:t>Highly customizable</a:t>
+            </a:r>
+          </a:p>
+          <a:p>
+            <a:pPr>
+              <a:lnSpc>
+                <a:spcPct val="100000"/>
+              </a:lnSpc>
+            </a:pPr>
+            <a:r>
+              <a:rPr lang="en-US" dirty="0" smtClean="0"/>
+              <a:t>Easy to solve problems (with the internet!)</a:t>
+            </a:r>
+            <a:endParaRPr lang="en-US" dirty="0" smtClean="0"/>
+          </a:p>
+        </p:txBody>
+      </p:sp>
+    </p:spTree>
+    <p:extLst>
+      <p:ext uri="{BB962C8B-B14F-4D97-AF65-F5344CB8AC3E}">
+        <p14:creationId xmlns:p14="http://schemas.microsoft.com/office/powerpoint/2010/main" val="3933805023"/>
+      </p:ext>
+    </p:extLst>
+  </p:cSld>
+  <p:clrMapOvr>
+    <a:masterClrMapping/>
+  </p:clrMapOvr>
+  <p:timing>
+    <p:tnLst>
+      <p:par>
+        <p:cTn id="1" dur="indefinite" restart="never" nodeType="tmRoot">
+          <p:childTnLst>
+            <p:seq concurrent="1" nextAc="seek">
+              <p:cTn id="2" dur="indefinite" nodeType="mainSeq">
+                <p:childTnLst>
                   <p:par>
-                    <p:cTn id="19" fill="hold">
+                    <p:cTn id="3" fill="hold">
                       <p:stCondLst>
                         <p:cond delay="indefinite"/>
                       </p:stCondLst>
                       <p:childTnLst>
                         <p:par>
-                          <p:cTn id="20" fill="hold">
+                          <p:cTn id="4" fill="hold">
                             <p:stCondLst>
                               <p:cond delay="0"/>
                             </p:stCondLst>
                             <p:childTnLst>
                               <p:par>
-                                <p:cTn id="21" presetID="1" presetClass="entr" presetSubtype="0" fill="hold" nodeType="clickEffect">
+                                <p:cTn id="5" presetID="1" presetClass="entr" presetSubtype="0" fill="hold" nodeType="clickEffect">
                                   <p:stCondLst>
                                     <p:cond delay="0"/>
                                   </p:stCondLst>
                                   <p:childTnLst>
                                     <p:set>
                                       <p:cBhvr>
-                                        <p:cTn id="22" dur="1" fill="hold">
+                                        <p:cTn id="6" dur="1" fill="hold">
                                           <p:stCondLst>
                                             <p:cond delay="0"/>
                                           </p:stCondLst>
@@ -7513,7 +7626,7 @@
                                         <p:tgtEl>
                                           <p:spTgt spid="3">
                                             <p:txEl>
-                                              <p:pRg st="4" end="4"/>
+                                              <p:pRg st="0" end="0"/>
                                             </p:txEl>
                                           </p:spTgt>
                                         </p:tgtEl>
@@ -7535,26 +7648,26 @@
                     </p:cTn>
                   </p:par>
                   <p:par>
-                    <p:cTn id="23" fill="hold">
+                    <p:cTn id="7" fill="hold">
                       <p:stCondLst>
                         <p:cond delay="indefinite"/>
                       </p:stCondLst>
                       <p:childTnLst>
                         <p:par>
-                          <p:cTn id="24" fill="hold">
+                          <p:cTn id="8" fill="hold">
                             <p:stCondLst>
                               <p:cond delay="0"/>
                             </p:stCondLst>
                             <p:childTnLst>
                               <p:par>
-                                <p:cTn id="25" presetID="1" presetClass="entr" presetSubtype="0" fill="hold" nodeType="clickEffect">
+                                <p:cTn id="9" presetID="1" presetClass="entr" presetSubtype="0" fill="hold" nodeType="clickEffect">
                                   <p:stCondLst>
                                     <p:cond delay="0"/>
                                   </p:stCondLst>
                                   <p:childTnLst>
                                     <p:set>
                                       <p:cBhvr>
-                                        <p:cTn id="26" dur="1" fill="hold">
+                                        <p:cTn id="10" dur="1" fill="hold">
                                           <p:stCondLst>
                                             <p:cond delay="0"/>
                                           </p:stCondLst>
@@ -7562,7 +7675,7 @@
                                         <p:tgtEl>
                                           <p:spTgt spid="3">
                                             <p:txEl>
-                                              <p:pRg st="5" end="5"/>
+                                              <p:pRg st="1" end="1"/>
                                             </p:txEl>
                                           </p:spTgt>
                                         </p:tgtEl>
@@ -7584,26 +7697,26 @@
                     </p:cTn>
                   </p:par>
                   <p:par>
-                    <p:cTn id="27" fill="hold">
+                    <p:cTn id="11" fill="hold">
                       <p:stCondLst>
                         <p:cond delay="indefinite"/>
                       </p:stCondLst>
                       <p:childTnLst>
                         <p:par>
-                          <p:cTn id="28" fill="hold">
+                          <p:cTn id="12" fill="hold">
                             <p:stCondLst>
                               <p:cond delay="0"/>
                             </p:stCondLst>
                             <p:childTnLst>
                               <p:par>
-                                <p:cTn id="29" presetID="1" presetClass="entr" presetSubtype="0" fill="hold" nodeType="clickEffect">
+                                <p:cTn id="13" presetID="1" presetClass="entr" presetSubtype="0" fill="hold" nodeType="clickEffect">
                                   <p:stCondLst>
                                     <p:cond delay="0"/>
                                   </p:stCondLst>
                                   <p:childTnLst>
                                     <p:set>
                                       <p:cBhvr>
-                                        <p:cTn id="30" dur="1" fill="hold">
+                                        <p:cTn id="14" dur="1" fill="hold">
                                           <p:stCondLst>
                                             <p:cond delay="0"/>
                                           </p:stCondLst>
@@ -7611,56 +7724,7 @@
                                         <p:tgtEl>
                                           <p:spTgt spid="3">
                                             <p:txEl>
-                                              <p:pRg st="6" end="6"/>
-                                            </p:txEl>
-                                          </p:spTgt>
-                                        </p:tgtEl>
-                                        <p:attrNameLst>
-                                          <p:attrName>style.visibility</p:attrName>
-                                        </p:attrNameLst>
-                                      </p:cBhvr>
-                                      <p:to>
-                                        <p:strVal val="visible"/>
-                                      </p:to>
-                                    </p:set>
-                                  </p:childTnLst>
-                                </p:cTn>
-                              </p:par>
-                            </p:childTnLst>
-                          </p:cTn>
-                        </p:par>
-                      </p:childTnLst>
-                    </p:cTn>
-                  </p:par>
-                  <p:par>
-                    <p:cTn id="31" fill="hold">
-                      <p:stCondLst>
-                        <p:cond delay="indefinite"/>
-                      </p:stCondLst>
-                      <p:childTnLst>
-                        <p:par>
-                          <p:cTn id="32" fill="hold">
-                            <p:stCondLst>
-                              <p:cond delay="0"/>
-                            </p:stCondLst>
-                            <p:childTnLst>
-                              <p:par>
-                                <p:cTn id="33" presetID="1" presetClass="entr" presetSubtype="0" fill="hold" nodeType="clickEffect">
-                                  <p:stCondLst>
-                                    <p:cond delay="0"/>
-                                  </p:stCondLst>
-                                  <p:childTnLst>
-                                    <p:set>
-                                      <p:cBhvr>
-                                        <p:cTn id="34" dur="1" fill="hold">
-                                          <p:stCondLst>
-                                            <p:cond delay="0"/>
-                                          </p:stCondLst>
-                                        </p:cTn>
-                                        <p:tgtEl>
-                                          <p:spTgt spid="3">
-                                            <p:txEl>
-                                              <p:pRg st="7" end="7"/>
+                                              <p:pRg st="2" end="2"/>
                                             </p:txEl>
                                           </p:spTgt>
                                         </p:tgtEl>
@@ -7706,7 +7770,7 @@
 </p:sld>
 </file>
 
-<file path=ppt/slides/slide11.xml><?xml version="1.0" encoding="utf-8"?>
+<file path=ppt/slides/slide12.xml><?xml version="1.0" encoding="utf-8"?>
 <p:sld xmlns:a="http://schemas.openxmlformats.org/drawingml/2006/main" xmlns:r="http://schemas.openxmlformats.org/officeDocument/2006/relationships" xmlns:p="http://schemas.openxmlformats.org/presentationml/2006/main">
   <p:cSld>
     <p:spTree>
@@ -7767,7 +7831,7 @@
 </p:sld>
 </file>
 
-<file path=ppt/slides/slide12.xml><?xml version="1.0" encoding="utf-8"?>
+<file path=ppt/slides/slide13.xml><?xml version="1.0" encoding="utf-8"?>
 <p:sld xmlns:a="http://schemas.openxmlformats.org/drawingml/2006/main" xmlns:r="http://schemas.openxmlformats.org/officeDocument/2006/relationships" xmlns:p="http://schemas.openxmlformats.org/presentationml/2006/main">
   <p:cSld>
     <p:spTree>
@@ -7989,7 +8053,7 @@
 </p:sld>
 </file>
 
-<file path=ppt/slides/slide13.xml><?xml version="1.0" encoding="utf-8"?>
+<file path=ppt/slides/slide14.xml><?xml version="1.0" encoding="utf-8"?>
 <p:sld xmlns:a="http://schemas.openxmlformats.org/drawingml/2006/main" xmlns:r="http://schemas.openxmlformats.org/officeDocument/2006/relationships" xmlns:p="http://schemas.openxmlformats.org/presentationml/2006/main">
   <p:cSld>
     <p:spTree>
@@ -8211,67 +8275,6 @@
 </p:sld>
 </file>
 
-<file path=ppt/slides/slide14.xml><?xml version="1.0" encoding="utf-8"?>
-<p:sld xmlns:a="http://schemas.openxmlformats.org/drawingml/2006/main" xmlns:r="http://schemas.openxmlformats.org/officeDocument/2006/relationships" xmlns:p="http://schemas.openxmlformats.org/presentationml/2006/main">
-  <p:cSld>
-    <p:spTree>
-      <p:nvGrpSpPr>
-        <p:cNvPr id="1" name=""/>
-        <p:cNvGrpSpPr/>
-        <p:nvPr/>
-      </p:nvGrpSpPr>
-      <p:grpSpPr>
-        <a:xfrm>
-          <a:off x="0" y="0"/>
-          <a:ext cx="0" cy="0"/>
-          <a:chOff x="0" y="0"/>
-          <a:chExt cx="0" cy="0"/>
-        </a:xfrm>
-      </p:grpSpPr>
-      <p:pic>
-        <p:nvPicPr>
-          <p:cNvPr id="2" name="Picture 1"/>
-          <p:cNvPicPr>
-            <a:picLocks noChangeAspect="1"/>
-          </p:cNvPicPr>
-          <p:nvPr/>
-        </p:nvPicPr>
-        <p:blipFill>
-          <a:blip r:embed="rId3"/>
-          <a:stretch>
-            <a:fillRect/>
-          </a:stretch>
-        </p:blipFill>
-        <p:spPr>
-          <a:xfrm>
-            <a:off x="-158010" y="1588482"/>
-            <a:ext cx="12350010" cy="4038591"/>
-          </a:xfrm>
-          <a:prstGeom prst="rect">
-            <a:avLst/>
-          </a:prstGeom>
-        </p:spPr>
-      </p:pic>
-    </p:spTree>
-    <p:extLst>
-      <p:ext uri="{BB962C8B-B14F-4D97-AF65-F5344CB8AC3E}">
-        <p14:creationId xmlns:p14="http://schemas.microsoft.com/office/powerpoint/2010/main" val="1892221556"/>
-      </p:ext>
-    </p:extLst>
-  </p:cSld>
-  <p:clrMapOvr>
-    <a:masterClrMapping/>
-  </p:clrMapOvr>
-  <p:timing>
-    <p:tnLst>
-      <p:par>
-        <p:cTn id="1" dur="indefinite" restart="never" nodeType="tmRoot"/>
-      </p:par>
-    </p:tnLst>
-  </p:timing>
-</p:sld>
-</file>
-
 <file path=ppt/slides/slide15.xml><?xml version="1.0" encoding="utf-8"?>
 <p:sld xmlns:a="http://schemas.openxmlformats.org/drawingml/2006/main" xmlns:r="http://schemas.openxmlformats.org/officeDocument/2006/relationships" xmlns:p="http://schemas.openxmlformats.org/presentationml/2006/main">
   <p:cSld>
@@ -8385,7 +8388,15 @@
           <a:p>
             <a:r>
               <a:rPr lang="en-US" dirty="0" smtClean="0"/>
-              <a:t>Workflow	</a:t>
+              <a:t>How do yo</a:t>
+            </a:r>
+            <a:r>
+              <a:rPr lang="en-US" dirty="0" smtClean="0"/>
+              <a:t>u write your code to…</a:t>
+            </a:r>
+            <a:r>
+              <a:rPr lang="en-US" dirty="0" smtClean="0"/>
+              <a:t>	</a:t>
             </a:r>
             <a:endParaRPr lang="en-US" dirty="0"/>
           </a:p>
@@ -49475,19 +49486,16 @@
           </a:p>
           <a:p>
             <a:r>
-              <a:rPr lang="en-US" dirty="0"/>
-              <a:t>Long, complex operations: split into </a:t>
-            </a:r>
-            <a:r>
               <a:rPr lang="en-US" dirty="0" smtClean="0"/>
-              <a:t>several independent scripts</a:t>
+              <a:t>Much faster than linear computing</a:t>
             </a:r>
           </a:p>
           <a:p>
             <a:r>
               <a:rPr lang="en-US" dirty="0" smtClean="0"/>
-              <a:t>Simultaneously perform operations on multiple machines</a:t>
+              <a:t>Simplify scripts</a:t>
             </a:r>
+            <a:endParaRPr lang="en-US" dirty="0" smtClean="0"/>
           </a:p>
           <a:p>
             <a:r>
@@ -51123,41 +51131,72 @@
             <a:pPr lvl="1"/>
             <a:r>
               <a:rPr lang="en-US" dirty="0" smtClean="0"/>
-              <a:t>Picking the proper tool requires understanding the issues at hand</a:t>
+              <a:t>Picking the proper tool </a:t>
             </a:r>
+            <a:endParaRPr lang="en-US" dirty="0" smtClean="0"/>
           </a:p>
           <a:p>
             <a:pPr lvl="1"/>
             <a:r>
               <a:rPr lang="en-US" dirty="0" smtClean="0"/>
-              <a:t>ggplot2 is an excellent package for static mapping &amp; foundational understanding of visualization</a:t>
+              <a:t>ggplot2 is a great starting point</a:t>
+            </a:r>
+          </a:p>
+          <a:p>
+            <a:pPr lvl="1"/>
+            <a:endParaRPr lang="en-US" dirty="0" smtClean="0"/>
+          </a:p>
+          <a:p>
+            <a:r>
+              <a:rPr lang="en-US" dirty="0" smtClean="0"/>
+              <a:t>Code Architecture</a:t>
+            </a:r>
+            <a:endParaRPr lang="en-US" dirty="0" smtClean="0"/>
+          </a:p>
+          <a:p>
+            <a:pPr lvl="1"/>
+            <a:r>
+              <a:rPr lang="en-US" dirty="0" smtClean="0"/>
+              <a:t>Picking the proper code </a:t>
+            </a:r>
+            <a:r>
+              <a:rPr lang="en-US" dirty="0" smtClean="0"/>
+              <a:t>structure</a:t>
+            </a:r>
+          </a:p>
+          <a:p>
+            <a:pPr marL="457200" lvl="1" indent="0">
+              <a:buNone/>
+            </a:pPr>
+            <a:r>
+              <a:rPr lang="en-US" dirty="0" smtClean="0"/>
+              <a:t> </a:t>
             </a:r>
           </a:p>
           <a:p>
             <a:r>
               <a:rPr lang="en-US" dirty="0" smtClean="0"/>
-              <a:t>Workflow</a:t>
+              <a:t>Thank </a:t>
             </a:r>
+            <a:r>
+              <a:rPr lang="en-US" dirty="0" smtClean="0"/>
+              <a:t>you! Questions? </a:t>
+            </a:r>
+            <a:endParaRPr lang="en-US" dirty="0"/>
           </a:p>
           <a:p>
-            <a:pPr lvl="1"/>
+            <a:pPr marL="0" indent="0">
+              <a:buNone/>
+            </a:pPr>
             <a:r>
               <a:rPr lang="en-US" dirty="0" smtClean="0"/>
-              <a:t>Picking the proper code structure requires understanding the issues at hand</a:t>
+              <a:t>Amelia Bertozzi-Villa </a:t>
             </a:r>
-          </a:p>
-          <a:p>
-            <a:pPr lvl="1"/>
             <a:r>
-              <a:rPr lang="en-US" dirty="0" smtClean="0"/>
-              <a:t>The more comfortable you get with different, code architectures, the cleaner, faster, and more interpretable your code will be</a:t>
+              <a:rPr lang="en-US" smtClean="0"/>
+              <a:t>: abertozz@uw.edu</a:t>
             </a:r>
-          </a:p>
-          <a:p>
-            <a:r>
-              <a:rPr lang="en-US" dirty="0" smtClean="0"/>
-              <a:t>Thank you! Questions? </a:t>
-            </a:r>
+            <a:endParaRPr lang="en-US" dirty="0" smtClean="0"/>
           </a:p>
           <a:p>
             <a:pPr lvl="1"/>
@@ -51358,7 +51397,7 @@
                                         <p:tgtEl>
                                           <p:spTgt spid="3">
                                             <p:txEl>
-                                              <p:pRg st="3" end="3"/>
+                                              <p:pRg st="4" end="4"/>
                                             </p:txEl>
                                           </p:spTgt>
                                         </p:tgtEl>
@@ -51407,7 +51446,7 @@
                                         <p:tgtEl>
                                           <p:spTgt spid="3">
                                             <p:txEl>
-                                              <p:pRg st="4" end="4"/>
+                                              <p:pRg st="5" end="5"/>
                                             </p:txEl>
                                           </p:spTgt>
                                         </p:tgtEl>
@@ -51456,7 +51495,7 @@
                                         <p:tgtEl>
                                           <p:spTgt spid="3">
                                             <p:txEl>
-                                              <p:pRg st="5" end="5"/>
+                                              <p:pRg st="6" end="6"/>
                                             </p:txEl>
                                           </p:spTgt>
                                         </p:tgtEl>
@@ -51505,7 +51544,56 @@
                                         <p:tgtEl>
                                           <p:spTgt spid="3">
                                             <p:txEl>
-                                              <p:pRg st="6" end="6"/>
+                                              <p:pRg st="7" end="7"/>
+                                            </p:txEl>
+                                          </p:spTgt>
+                                        </p:tgtEl>
+                                        <p:attrNameLst>
+                                          <p:attrName>style.visibility</p:attrName>
+                                        </p:attrNameLst>
+                                      </p:cBhvr>
+                                      <p:to>
+                                        <p:strVal val="visible"/>
+                                      </p:to>
+                                    </p:set>
+                                  </p:childTnLst>
+                                </p:cTn>
+                              </p:par>
+                            </p:childTnLst>
+                          </p:cTn>
+                        </p:par>
+                      </p:childTnLst>
+                    </p:cTn>
+                  </p:par>
+                  <p:par>
+                    <p:cTn id="31" fill="hold">
+                      <p:stCondLst>
+                        <p:cond delay="indefinite"/>
+                      </p:stCondLst>
+                      <p:childTnLst>
+                        <p:par>
+                          <p:cTn id="32" fill="hold">
+                            <p:stCondLst>
+                              <p:cond delay="0"/>
+                            </p:stCondLst>
+                            <p:childTnLst>
+                              <p:par>
+                                <p:cTn id="33" presetID="1" presetClass="entr" presetSubtype="0" fill="hold" nodeType="clickEffect">
+                                  <p:stCondLst>
+                                    <p:cond delay="0"/>
+                                  </p:stCondLst>
+                                  <p:childTnLst>
+                                    <p:set>
+                                      <p:cBhvr>
+                                        <p:cTn id="34" dur="1" fill="hold">
+                                          <p:stCondLst>
+                                            <p:cond delay="0"/>
+                                          </p:stCondLst>
+                                        </p:cTn>
+                                        <p:tgtEl>
+                                          <p:spTgt spid="3">
+                                            <p:txEl>
+                                              <p:pRg st="8" end="8"/>
                                             </p:txEl>
                                           </p:spTgt>
                                         </p:tgtEl>

</xml_diff>

<commit_message>
final touches to powerpoint
</commit_message>
<xml_diff>
--- a/class_3_4.pptx
+++ b/class_3_4.pptx
@@ -5,7 +5,7 @@
     <p:sldMasterId id="2147483648" r:id="rId1"/>
   </p:sldMasterIdLst>
   <p:notesMasterIdLst>
-    <p:notesMasterId r:id="rId29"/>
+    <p:notesMasterId r:id="rId30"/>
   </p:notesMasterIdLst>
   <p:sldIdLst>
     <p:sldId id="256" r:id="rId2"/>
@@ -35,6 +35,7 @@
     <p:sldId id="282" r:id="rId26"/>
     <p:sldId id="283" r:id="rId27"/>
     <p:sldId id="291" r:id="rId28"/>
+    <p:sldId id="294" r:id="rId29"/>
   </p:sldIdLst>
   <p:sldSz cx="12192000" cy="6858000"/>
   <p:notesSz cx="6858000" cy="9144000"/>
@@ -908,11 +909,11 @@
           <c:showPercent val="0"/>
           <c:showBubbleSize val="0"/>
         </c:dLbls>
-        <c:axId val="1804806256"/>
-        <c:axId val="1804803536"/>
+        <c:axId val="-8986304"/>
+        <c:axId val="-8992288"/>
       </c:scatterChart>
       <c:valAx>
-        <c:axId val="1804806256"/>
+        <c:axId val="-8986304"/>
         <c:scaling>
           <c:orientation val="minMax"/>
         </c:scaling>
@@ -969,12 +970,12 @@
             <a:endParaRPr lang="en-US"/>
           </a:p>
         </c:txPr>
-        <c:crossAx val="1804803536"/>
+        <c:crossAx val="-8992288"/>
         <c:crosses val="autoZero"/>
         <c:crossBetween val="midCat"/>
       </c:valAx>
       <c:valAx>
-        <c:axId val="1804803536"/>
+        <c:axId val="-8992288"/>
         <c:scaling>
           <c:orientation val="minMax"/>
         </c:scaling>
@@ -1031,7 +1032,7 @@
             <a:endParaRPr lang="en-US"/>
           </a:p>
         </c:txPr>
-        <c:crossAx val="1804806256"/>
+        <c:crossAx val="-8986304"/>
         <c:crosses val="autoZero"/>
         <c:crossBetween val="midCat"/>
       </c:valAx>
@@ -1740,7 +1741,7 @@
           <a:p>
             <a:fld id="{D321804F-8474-4B3C-BEC9-4B8B6CCBA09E}" type="datetimeFigureOut">
               <a:rPr lang="en-US" smtClean="0"/>
-              <a:t>3/3/2016</a:t>
+              <a:t>3/4/2016</a:t>
             </a:fld>
             <a:endParaRPr lang="en-US"/>
           </a:p>
@@ -2336,6 +2337,104 @@
           <a:p>
             <a:fld id="{D10C9AC4-446C-45D9-A8A8-E1DCCF98E2F5}" type="slidenum">
               <a:rPr lang="en-US" smtClean="0"/>
+              <a:t>10</a:t>
+            </a:fld>
+            <a:endParaRPr lang="en-US"/>
+          </a:p>
+        </p:txBody>
+      </p:sp>
+    </p:spTree>
+    <p:extLst>
+      <p:ext uri="{BB962C8B-B14F-4D97-AF65-F5344CB8AC3E}">
+        <p14:creationId xmlns:p14="http://schemas.microsoft.com/office/powerpoint/2010/main" val="4116216622"/>
+      </p:ext>
+    </p:extLst>
+  </p:cSld>
+  <p:clrMapOvr>
+    <a:masterClrMapping/>
+  </p:clrMapOvr>
+</p:notes>
+</file>
+
+<file path=ppt/notesSlides/notesSlide11.xml><?xml version="1.0" encoding="utf-8"?>
+<p:notes xmlns:a="http://schemas.openxmlformats.org/drawingml/2006/main" xmlns:r="http://schemas.openxmlformats.org/officeDocument/2006/relationships" xmlns:p="http://schemas.openxmlformats.org/presentationml/2006/main">
+  <p:cSld>
+    <p:spTree>
+      <p:nvGrpSpPr>
+        <p:cNvPr id="1" name=""/>
+        <p:cNvGrpSpPr/>
+        <p:nvPr/>
+      </p:nvGrpSpPr>
+      <p:grpSpPr>
+        <a:xfrm>
+          <a:off x="0" y="0"/>
+          <a:ext cx="0" cy="0"/>
+          <a:chOff x="0" y="0"/>
+          <a:chExt cx="0" cy="0"/>
+        </a:xfrm>
+      </p:grpSpPr>
+      <p:sp>
+        <p:nvSpPr>
+          <p:cNvPr id="2" name="Slide Image Placeholder 1"/>
+          <p:cNvSpPr>
+            <a:spLocks noGrp="1" noRot="1" noChangeAspect="1"/>
+          </p:cNvSpPr>
+          <p:nvPr>
+            <p:ph type="sldImg"/>
+          </p:nvPr>
+        </p:nvSpPr>
+        <p:spPr/>
+      </p:sp>
+      <p:sp>
+        <p:nvSpPr>
+          <p:cNvPr id="3" name="Notes Placeholder 2"/>
+          <p:cNvSpPr>
+            <a:spLocks noGrp="1"/>
+          </p:cNvSpPr>
+          <p:nvPr>
+            <p:ph type="body" idx="1"/>
+          </p:nvPr>
+        </p:nvSpPr>
+        <p:spPr/>
+        <p:txBody>
+          <a:bodyPr/>
+          <a:lstStyle/>
+          <a:p>
+            <a:r>
+              <a:rPr lang="en-US" dirty="0" smtClean="0"/>
+              <a:t>Segue</a:t>
+            </a:r>
+            <a:r>
+              <a:rPr lang="en-US" baseline="0" dirty="0" smtClean="0"/>
+              <a:t> into email exchange with Rakhi and Anil</a:t>
+            </a:r>
+          </a:p>
+          <a:p>
+            <a:r>
+              <a:rPr lang="en-US" baseline="0" dirty="0" smtClean="0"/>
+              <a:t>  </a:t>
+            </a:r>
+            <a:endParaRPr lang="en-US" dirty="0"/>
+          </a:p>
+        </p:txBody>
+      </p:sp>
+      <p:sp>
+        <p:nvSpPr>
+          <p:cNvPr id="4" name="Slide Number Placeholder 3"/>
+          <p:cNvSpPr>
+            <a:spLocks noGrp="1"/>
+          </p:cNvSpPr>
+          <p:nvPr>
+            <p:ph type="sldNum" sz="quarter" idx="10"/>
+          </p:nvPr>
+        </p:nvSpPr>
+        <p:spPr/>
+        <p:txBody>
+          <a:bodyPr/>
+          <a:lstStyle/>
+          <a:p>
+            <a:fld id="{D10C9AC4-446C-45D9-A8A8-E1DCCF98E2F5}" type="slidenum">
+              <a:rPr lang="en-US" smtClean="0"/>
               <a:t>11</a:t>
             </a:fld>
             <a:endParaRPr lang="en-US"/>
@@ -2355,7 +2454,7 @@
 </p:notes>
 </file>
 
-<file path=ppt/notesSlides/notesSlide11.xml><?xml version="1.0" encoding="utf-8"?>
+<file path=ppt/notesSlides/notesSlide12.xml><?xml version="1.0" encoding="utf-8"?>
 <p:notes xmlns:a="http://schemas.openxmlformats.org/drawingml/2006/main" xmlns:r="http://schemas.openxmlformats.org/officeDocument/2006/relationships" xmlns:p="http://schemas.openxmlformats.org/presentationml/2006/main">
   <p:cSld>
     <p:spTree>
@@ -2447,7 +2546,7 @@
 </p:notes>
 </file>
 
-<file path=ppt/notesSlides/notesSlide12.xml><?xml version="1.0" encoding="utf-8"?>
+<file path=ppt/notesSlides/notesSlide13.xml><?xml version="1.0" encoding="utf-8"?>
 <p:notes xmlns:a="http://schemas.openxmlformats.org/drawingml/2006/main" xmlns:r="http://schemas.openxmlformats.org/officeDocument/2006/relationships" xmlns:p="http://schemas.openxmlformats.org/presentationml/2006/main">
   <p:cSld>
     <p:spTree>
@@ -2531,7 +2630,7 @@
 </p:notes>
 </file>
 
-<file path=ppt/notesSlides/notesSlide13.xml><?xml version="1.0" encoding="utf-8"?>
+<file path=ppt/notesSlides/notesSlide14.xml><?xml version="1.0" encoding="utf-8"?>
 <p:notes xmlns:a="http://schemas.openxmlformats.org/drawingml/2006/main" xmlns:r="http://schemas.openxmlformats.org/officeDocument/2006/relationships" xmlns:p="http://schemas.openxmlformats.org/presentationml/2006/main">
   <p:cSld>
     <p:spTree>
@@ -2665,7 +2764,7 @@
 </p:notes>
 </file>
 
-<file path=ppt/notesSlides/notesSlide14.xml><?xml version="1.0" encoding="utf-8"?>
+<file path=ppt/notesSlides/notesSlide15.xml><?xml version="1.0" encoding="utf-8"?>
 <p:notes xmlns:a="http://schemas.openxmlformats.org/drawingml/2006/main" xmlns:r="http://schemas.openxmlformats.org/officeDocument/2006/relationships" xmlns:p="http://schemas.openxmlformats.org/presentationml/2006/main">
   <p:cSld>
     <p:spTree>
@@ -2757,7 +2856,7 @@
 </p:notes>
 </file>
 
-<file path=ppt/notesSlides/notesSlide15.xml><?xml version="1.0" encoding="utf-8"?>
+<file path=ppt/notesSlides/notesSlide16.xml><?xml version="1.0" encoding="utf-8"?>
 <p:notes xmlns:a="http://schemas.openxmlformats.org/drawingml/2006/main" xmlns:r="http://schemas.openxmlformats.org/officeDocument/2006/relationships" xmlns:p="http://schemas.openxmlformats.org/presentationml/2006/main">
   <p:cSld>
     <p:spTree>
@@ -2841,7 +2940,7 @@
 </p:notes>
 </file>
 
-<file path=ppt/notesSlides/notesSlide16.xml><?xml version="1.0" encoding="utf-8"?>
+<file path=ppt/notesSlides/notesSlide17.xml><?xml version="1.0" encoding="utf-8"?>
 <p:notes xmlns:a="http://schemas.openxmlformats.org/drawingml/2006/main" xmlns:r="http://schemas.openxmlformats.org/officeDocument/2006/relationships" xmlns:p="http://schemas.openxmlformats.org/presentationml/2006/main">
   <p:cSld>
     <p:spTree>
@@ -3017,6 +3116,90 @@
           <a:bodyPr/>
           <a:lstStyle/>
           <a:p>
+            <a:endParaRPr lang="en-US" dirty="0"/>
+          </a:p>
+        </p:txBody>
+      </p:sp>
+      <p:sp>
+        <p:nvSpPr>
+          <p:cNvPr id="4" name="Slide Number Placeholder 3"/>
+          <p:cNvSpPr>
+            <a:spLocks noGrp="1"/>
+          </p:cNvSpPr>
+          <p:nvPr>
+            <p:ph type="sldNum" sz="quarter" idx="10"/>
+          </p:nvPr>
+        </p:nvSpPr>
+        <p:spPr/>
+        <p:txBody>
+          <a:bodyPr/>
+          <a:lstStyle/>
+          <a:p>
+            <a:fld id="{D10C9AC4-446C-45D9-A8A8-E1DCCF98E2F5}" type="slidenum">
+              <a:rPr lang="en-US" smtClean="0"/>
+              <a:t>2</a:t>
+            </a:fld>
+            <a:endParaRPr lang="en-US"/>
+          </a:p>
+        </p:txBody>
+      </p:sp>
+    </p:spTree>
+    <p:extLst>
+      <p:ext uri="{BB962C8B-B14F-4D97-AF65-F5344CB8AC3E}">
+        <p14:creationId xmlns:p14="http://schemas.microsoft.com/office/powerpoint/2010/main" val="1631560401"/>
+      </p:ext>
+    </p:extLst>
+  </p:cSld>
+  <p:clrMapOvr>
+    <a:masterClrMapping/>
+  </p:clrMapOvr>
+</p:notes>
+</file>
+
+<file path=ppt/notesSlides/notesSlide3.xml><?xml version="1.0" encoding="utf-8"?>
+<p:notes xmlns:a="http://schemas.openxmlformats.org/drawingml/2006/main" xmlns:r="http://schemas.openxmlformats.org/officeDocument/2006/relationships" xmlns:p="http://schemas.openxmlformats.org/presentationml/2006/main">
+  <p:cSld>
+    <p:spTree>
+      <p:nvGrpSpPr>
+        <p:cNvPr id="1" name=""/>
+        <p:cNvGrpSpPr/>
+        <p:nvPr/>
+      </p:nvGrpSpPr>
+      <p:grpSpPr>
+        <a:xfrm>
+          <a:off x="0" y="0"/>
+          <a:ext cx="0" cy="0"/>
+          <a:chOff x="0" y="0"/>
+          <a:chExt cx="0" cy="0"/>
+        </a:xfrm>
+      </p:grpSpPr>
+      <p:sp>
+        <p:nvSpPr>
+          <p:cNvPr id="2" name="Slide Image Placeholder 1"/>
+          <p:cNvSpPr>
+            <a:spLocks noGrp="1" noRot="1" noChangeAspect="1"/>
+          </p:cNvSpPr>
+          <p:nvPr>
+            <p:ph type="sldImg"/>
+          </p:nvPr>
+        </p:nvSpPr>
+        <p:spPr/>
+      </p:sp>
+      <p:sp>
+        <p:nvSpPr>
+          <p:cNvPr id="3" name="Notes Placeholder 2"/>
+          <p:cNvSpPr>
+            <a:spLocks noGrp="1"/>
+          </p:cNvSpPr>
+          <p:nvPr>
+            <p:ph type="body" idx="1"/>
+          </p:nvPr>
+        </p:nvSpPr>
+        <p:spPr/>
+        <p:txBody>
+          <a:bodyPr/>
+          <a:lstStyle/>
+          <a:p>
             <a:r>
               <a:rPr lang="en-US" dirty="0" smtClean="0"/>
               <a:t>Data can come in a wide range of formats: .</a:t>
@@ -3098,7 +3281,7 @@
 </p:notes>
 </file>
 
-<file path=ppt/notesSlides/notesSlide3.xml><?xml version="1.0" encoding="utf-8"?>
+<file path=ppt/notesSlides/notesSlide4.xml><?xml version="1.0" encoding="utf-8"?>
 <p:notes xmlns:a="http://schemas.openxmlformats.org/drawingml/2006/main" xmlns:r="http://schemas.openxmlformats.org/officeDocument/2006/relationships" xmlns:p="http://schemas.openxmlformats.org/presentationml/2006/main">
   <p:cSld>
     <p:spTree>
@@ -3208,7 +3391,7 @@
 </p:notes>
 </file>
 
-<file path=ppt/notesSlides/notesSlide4.xml><?xml version="1.0" encoding="utf-8"?>
+<file path=ppt/notesSlides/notesSlide5.xml><?xml version="1.0" encoding="utf-8"?>
 <p:notes xmlns:a="http://schemas.openxmlformats.org/drawingml/2006/main" xmlns:r="http://schemas.openxmlformats.org/officeDocument/2006/relationships" xmlns:p="http://schemas.openxmlformats.org/presentationml/2006/main">
   <p:cSld>
     <p:spTree>
@@ -3323,7 +3506,7 @@
 </p:notes>
 </file>
 
-<file path=ppt/notesSlides/notesSlide5.xml><?xml version="1.0" encoding="utf-8"?>
+<file path=ppt/notesSlides/notesSlide6.xml><?xml version="1.0" encoding="utf-8"?>
 <p:notes xmlns:a="http://schemas.openxmlformats.org/drawingml/2006/main" xmlns:r="http://schemas.openxmlformats.org/officeDocument/2006/relationships" xmlns:p="http://schemas.openxmlformats.org/presentationml/2006/main">
   <p:cSld>
     <p:spTree>
@@ -3410,7 +3593,7 @@
 </p:notes>
 </file>
 
-<file path=ppt/notesSlides/notesSlide6.xml><?xml version="1.0" encoding="utf-8"?>
+<file path=ppt/notesSlides/notesSlide7.xml><?xml version="1.0" encoding="utf-8"?>
 <p:notes xmlns:a="http://schemas.openxmlformats.org/drawingml/2006/main" xmlns:r="http://schemas.openxmlformats.org/officeDocument/2006/relationships" xmlns:p="http://schemas.openxmlformats.org/presentationml/2006/main">
   <p:cSld>
     <p:spTree>
@@ -3584,7 +3767,7 @@
 </p:notes>
 </file>
 
-<file path=ppt/notesSlides/notesSlide7.xml><?xml version="1.0" encoding="utf-8"?>
+<file path=ppt/notesSlides/notesSlide8.xml><?xml version="1.0" encoding="utf-8"?>
 <p:notes xmlns:a="http://schemas.openxmlformats.org/drawingml/2006/main" xmlns:r="http://schemas.openxmlformats.org/officeDocument/2006/relationships" xmlns:p="http://schemas.openxmlformats.org/presentationml/2006/main">
   <p:cSld>
     <p:spTree>
@@ -3679,7 +3862,7 @@
 </p:notes>
 </file>
 
-<file path=ppt/notesSlides/notesSlide8.xml><?xml version="1.0" encoding="utf-8"?>
+<file path=ppt/notesSlides/notesSlide9.xml><?xml version="1.0" encoding="utf-8"?>
 <p:notes xmlns:a="http://schemas.openxmlformats.org/drawingml/2006/main" xmlns:r="http://schemas.openxmlformats.org/officeDocument/2006/relationships" xmlns:p="http://schemas.openxmlformats.org/presentationml/2006/main">
   <p:cSld>
     <p:spTree>
@@ -3807,104 +3990,6 @@
     <p:extLst>
       <p:ext uri="{BB962C8B-B14F-4D97-AF65-F5344CB8AC3E}">
         <p14:creationId xmlns:p14="http://schemas.microsoft.com/office/powerpoint/2010/main" val="4136463741"/>
-      </p:ext>
-    </p:extLst>
-  </p:cSld>
-  <p:clrMapOvr>
-    <a:masterClrMapping/>
-  </p:clrMapOvr>
-</p:notes>
-</file>
-
-<file path=ppt/notesSlides/notesSlide9.xml><?xml version="1.0" encoding="utf-8"?>
-<p:notes xmlns:a="http://schemas.openxmlformats.org/drawingml/2006/main" xmlns:r="http://schemas.openxmlformats.org/officeDocument/2006/relationships" xmlns:p="http://schemas.openxmlformats.org/presentationml/2006/main">
-  <p:cSld>
-    <p:spTree>
-      <p:nvGrpSpPr>
-        <p:cNvPr id="1" name=""/>
-        <p:cNvGrpSpPr/>
-        <p:nvPr/>
-      </p:nvGrpSpPr>
-      <p:grpSpPr>
-        <a:xfrm>
-          <a:off x="0" y="0"/>
-          <a:ext cx="0" cy="0"/>
-          <a:chOff x="0" y="0"/>
-          <a:chExt cx="0" cy="0"/>
-        </a:xfrm>
-      </p:grpSpPr>
-      <p:sp>
-        <p:nvSpPr>
-          <p:cNvPr id="2" name="Slide Image Placeholder 1"/>
-          <p:cNvSpPr>
-            <a:spLocks noGrp="1" noRot="1" noChangeAspect="1"/>
-          </p:cNvSpPr>
-          <p:nvPr>
-            <p:ph type="sldImg"/>
-          </p:nvPr>
-        </p:nvSpPr>
-        <p:spPr/>
-      </p:sp>
-      <p:sp>
-        <p:nvSpPr>
-          <p:cNvPr id="3" name="Notes Placeholder 2"/>
-          <p:cNvSpPr>
-            <a:spLocks noGrp="1"/>
-          </p:cNvSpPr>
-          <p:nvPr>
-            <p:ph type="body" idx="1"/>
-          </p:nvPr>
-        </p:nvSpPr>
-        <p:spPr/>
-        <p:txBody>
-          <a:bodyPr/>
-          <a:lstStyle/>
-          <a:p>
-            <a:r>
-              <a:rPr lang="en-US" dirty="0" smtClean="0"/>
-              <a:t>Segue</a:t>
-            </a:r>
-            <a:r>
-              <a:rPr lang="en-US" baseline="0" dirty="0" smtClean="0"/>
-              <a:t> into email exchange with Rakhi and Anil</a:t>
-            </a:r>
-          </a:p>
-          <a:p>
-            <a:r>
-              <a:rPr lang="en-US" baseline="0" dirty="0" smtClean="0"/>
-              <a:t>  </a:t>
-            </a:r>
-            <a:endParaRPr lang="en-US" dirty="0"/>
-          </a:p>
-        </p:txBody>
-      </p:sp>
-      <p:sp>
-        <p:nvSpPr>
-          <p:cNvPr id="4" name="Slide Number Placeholder 3"/>
-          <p:cNvSpPr>
-            <a:spLocks noGrp="1"/>
-          </p:cNvSpPr>
-          <p:nvPr>
-            <p:ph type="sldNum" sz="quarter" idx="10"/>
-          </p:nvPr>
-        </p:nvSpPr>
-        <p:spPr/>
-        <p:txBody>
-          <a:bodyPr/>
-          <a:lstStyle/>
-          <a:p>
-            <a:fld id="{D10C9AC4-446C-45D9-A8A8-E1DCCF98E2F5}" type="slidenum">
-              <a:rPr lang="en-US" smtClean="0"/>
-              <a:t>10</a:t>
-            </a:fld>
-            <a:endParaRPr lang="en-US"/>
-          </a:p>
-        </p:txBody>
-      </p:sp>
-    </p:spTree>
-    <p:extLst>
-      <p:ext uri="{BB962C8B-B14F-4D97-AF65-F5344CB8AC3E}">
-        <p14:creationId xmlns:p14="http://schemas.microsoft.com/office/powerpoint/2010/main" val="4116216622"/>
       </p:ext>
     </p:extLst>
   </p:cSld>
@@ -4045,7 +4130,7 @@
           <a:p>
             <a:fld id="{A5C42B43-71C5-4126-819D-B934AB90E139}" type="datetimeFigureOut">
               <a:rPr lang="en-US" smtClean="0"/>
-              <a:t>3/3/2016</a:t>
+              <a:t>3/4/2016</a:t>
             </a:fld>
             <a:endParaRPr lang="en-US"/>
           </a:p>
@@ -4215,7 +4300,7 @@
           <a:p>
             <a:fld id="{A5C42B43-71C5-4126-819D-B934AB90E139}" type="datetimeFigureOut">
               <a:rPr lang="en-US" smtClean="0"/>
-              <a:t>3/3/2016</a:t>
+              <a:t>3/4/2016</a:t>
             </a:fld>
             <a:endParaRPr lang="en-US"/>
           </a:p>
@@ -4395,7 +4480,7 @@
           <a:p>
             <a:fld id="{A5C42B43-71C5-4126-819D-B934AB90E139}" type="datetimeFigureOut">
               <a:rPr lang="en-US" smtClean="0"/>
-              <a:t>3/3/2016</a:t>
+              <a:t>3/4/2016</a:t>
             </a:fld>
             <a:endParaRPr lang="en-US"/>
           </a:p>
@@ -4565,7 +4650,7 @@
           <a:p>
             <a:fld id="{A5C42B43-71C5-4126-819D-B934AB90E139}" type="datetimeFigureOut">
               <a:rPr lang="en-US" smtClean="0"/>
-              <a:t>3/3/2016</a:t>
+              <a:t>3/4/2016</a:t>
             </a:fld>
             <a:endParaRPr lang="en-US"/>
           </a:p>
@@ -4811,7 +4896,7 @@
           <a:p>
             <a:fld id="{A5C42B43-71C5-4126-819D-B934AB90E139}" type="datetimeFigureOut">
               <a:rPr lang="en-US" smtClean="0"/>
-              <a:t>3/3/2016</a:t>
+              <a:t>3/4/2016</a:t>
             </a:fld>
             <a:endParaRPr lang="en-US"/>
           </a:p>
@@ -5043,7 +5128,7 @@
           <a:p>
             <a:fld id="{A5C42B43-71C5-4126-819D-B934AB90E139}" type="datetimeFigureOut">
               <a:rPr lang="en-US" smtClean="0"/>
-              <a:t>3/3/2016</a:t>
+              <a:t>3/4/2016</a:t>
             </a:fld>
             <a:endParaRPr lang="en-US"/>
           </a:p>
@@ -5410,7 +5495,7 @@
           <a:p>
             <a:fld id="{A5C42B43-71C5-4126-819D-B934AB90E139}" type="datetimeFigureOut">
               <a:rPr lang="en-US" smtClean="0"/>
-              <a:t>3/3/2016</a:t>
+              <a:t>3/4/2016</a:t>
             </a:fld>
             <a:endParaRPr lang="en-US"/>
           </a:p>
@@ -5528,7 +5613,7 @@
           <a:p>
             <a:fld id="{A5C42B43-71C5-4126-819D-B934AB90E139}" type="datetimeFigureOut">
               <a:rPr lang="en-US" smtClean="0"/>
-              <a:t>3/3/2016</a:t>
+              <a:t>3/4/2016</a:t>
             </a:fld>
             <a:endParaRPr lang="en-US"/>
           </a:p>
@@ -5623,7 +5708,7 @@
           <a:p>
             <a:fld id="{A5C42B43-71C5-4126-819D-B934AB90E139}" type="datetimeFigureOut">
               <a:rPr lang="en-US" smtClean="0"/>
-              <a:t>3/3/2016</a:t>
+              <a:t>3/4/2016</a:t>
             </a:fld>
             <a:endParaRPr lang="en-US"/>
           </a:p>
@@ -5900,7 +5985,7 @@
           <a:p>
             <a:fld id="{A5C42B43-71C5-4126-819D-B934AB90E139}" type="datetimeFigureOut">
               <a:rPr lang="en-US" smtClean="0"/>
-              <a:t>3/3/2016</a:t>
+              <a:t>3/4/2016</a:t>
             </a:fld>
             <a:endParaRPr lang="en-US"/>
           </a:p>
@@ -6153,7 +6238,7 @@
           <a:p>
             <a:fld id="{A5C42B43-71C5-4126-819D-B934AB90E139}" type="datetimeFigureOut">
               <a:rPr lang="en-US" smtClean="0"/>
-              <a:t>3/3/2016</a:t>
+              <a:t>3/4/2016</a:t>
             </a:fld>
             <a:endParaRPr lang="en-US"/>
           </a:p>
@@ -6366,7 +6451,7 @@
           <a:p>
             <a:fld id="{A5C42B43-71C5-4126-819D-B934AB90E139}" type="datetimeFigureOut">
               <a:rPr lang="en-US" smtClean="0"/>
-              <a:t>3/3/2016</a:t>
+              <a:t>3/4/2016</a:t>
             </a:fld>
             <a:endParaRPr lang="en-US"/>
           </a:p>
@@ -7179,11 +7264,7 @@
             </a:pPr>
             <a:r>
               <a:rPr lang="en-US" dirty="0" smtClean="0"/>
-              <a:t>Why static</a:t>
-            </a:r>
-            <a:r>
-              <a:rPr lang="en-US" dirty="0" smtClean="0"/>
-              <a:t>?</a:t>
+              <a:t>Why static?</a:t>
             </a:r>
           </a:p>
           <a:p>
@@ -7196,7 +7277,6 @@
               <a:rPr lang="en-US" dirty="0" smtClean="0"/>
               <a:t>Printed documents</a:t>
             </a:r>
-            <a:endParaRPr lang="en-US" dirty="0" smtClean="0"/>
           </a:p>
           <a:p>
             <a:pPr lvl="1">
@@ -7206,11 +7286,7 @@
             </a:pPr>
             <a:r>
               <a:rPr lang="en-US" dirty="0" smtClean="0"/>
-              <a:t>Foundation </a:t>
-            </a:r>
-            <a:r>
-              <a:rPr lang="en-US" dirty="0" smtClean="0"/>
-              <a:t>for interactive visualization</a:t>
+              <a:t>Foundation for interactive visualization</a:t>
             </a:r>
           </a:p>
           <a:p>
@@ -7548,11 +7624,7 @@
             </a:pPr>
             <a:r>
               <a:rPr lang="en-US" dirty="0" smtClean="0"/>
-              <a:t>Standard </a:t>
-            </a:r>
-            <a:r>
-              <a:rPr lang="en-US" dirty="0" smtClean="0"/>
-              <a:t>aesthetic properties (aka: pretty)</a:t>
+              <a:t>Standard aesthetic properties (aka: pretty)</a:t>
             </a:r>
           </a:p>
           <a:p>
@@ -7576,7 +7648,6 @@
               <a:rPr lang="en-US" dirty="0" smtClean="0"/>
               <a:t>Easy to solve problems (with the internet!)</a:t>
             </a:r>
-            <a:endParaRPr lang="en-US" dirty="0" smtClean="0"/>
           </a:p>
         </p:txBody>
       </p:sp>
@@ -8300,7 +8371,7 @@
         </p:nvSpPr>
         <p:spPr>
           <a:xfrm>
-            <a:off x="1702420" y="2973658"/>
+            <a:off x="1983773" y="2593830"/>
             <a:ext cx="8995316" cy="646331"/>
           </a:xfrm>
           <a:prstGeom prst="rect">
@@ -8328,7 +8399,45 @@
             </a:r>
             <a:r>
               <a:rPr lang="en-US" sz="3600" dirty="0" smtClean="0"/>
-              <a:t>is to use it. </a:t>
+              <a:t>is </a:t>
+            </a:r>
+            <a:r>
+              <a:rPr lang="en-US" sz="3600" dirty="0" smtClean="0"/>
+              <a:t>to </a:t>
+            </a:r>
+            <a:r>
+              <a:rPr lang="en-US" sz="3600" dirty="0" smtClean="0"/>
+              <a:t>use it. </a:t>
+            </a:r>
+            <a:endParaRPr lang="en-US" sz="3600" dirty="0"/>
+          </a:p>
+        </p:txBody>
+      </p:sp>
+      <p:sp>
+        <p:nvSpPr>
+          <p:cNvPr id="3" name="TextBox 2"/>
+          <p:cNvSpPr txBox="1"/>
+          <p:nvPr/>
+        </p:nvSpPr>
+        <p:spPr>
+          <a:xfrm>
+            <a:off x="2293262" y="3998256"/>
+            <a:ext cx="7793273" cy="646331"/>
+          </a:xfrm>
+          <a:prstGeom prst="rect">
+            <a:avLst/>
+          </a:prstGeom>
+          <a:noFill/>
+        </p:spPr>
+        <p:txBody>
+          <a:bodyPr wrap="square" rtlCol="0">
+            <a:spAutoFit/>
+          </a:bodyPr>
+          <a:lstStyle/>
+          <a:p>
+            <a:r>
+              <a:rPr lang="en-US" sz="3600" dirty="0" smtClean="0"/>
+              <a:t>www.github.com/bertozzivill/intro_to_r</a:t>
             </a:r>
             <a:endParaRPr lang="en-US" sz="3600" dirty="0"/>
           </a:p>
@@ -8347,9 +8456,80 @@
   <p:timing>
     <p:tnLst>
       <p:par>
-        <p:cTn id="1" dur="indefinite" restart="never" nodeType="tmRoot"/>
+        <p:cTn id="1" dur="indefinite" restart="never" nodeType="tmRoot">
+          <p:childTnLst>
+            <p:seq concurrent="1" nextAc="seek">
+              <p:cTn id="2" dur="indefinite" nodeType="mainSeq">
+                <p:childTnLst>
+                  <p:par>
+                    <p:cTn id="3" fill="hold">
+                      <p:stCondLst>
+                        <p:cond delay="indefinite"/>
+                      </p:stCondLst>
+                      <p:childTnLst>
+                        <p:par>
+                          <p:cTn id="4" fill="hold">
+                            <p:stCondLst>
+                              <p:cond delay="0"/>
+                            </p:stCondLst>
+                            <p:childTnLst>
+                              <p:par>
+                                <p:cTn id="5" presetID="1" presetClass="entr" presetSubtype="0" fill="hold" grpId="0" nodeType="clickEffect">
+                                  <p:stCondLst>
+                                    <p:cond delay="0"/>
+                                  </p:stCondLst>
+                                  <p:childTnLst>
+                                    <p:set>
+                                      <p:cBhvr>
+                                        <p:cTn id="6" dur="1" fill="hold">
+                                          <p:stCondLst>
+                                            <p:cond delay="0"/>
+                                          </p:stCondLst>
+                                        </p:cTn>
+                                        <p:tgtEl>
+                                          <p:spTgt spid="3"/>
+                                        </p:tgtEl>
+                                        <p:attrNameLst>
+                                          <p:attrName>style.visibility</p:attrName>
+                                        </p:attrNameLst>
+                                      </p:cBhvr>
+                                      <p:to>
+                                        <p:strVal val="visible"/>
+                                      </p:to>
+                                    </p:set>
+                                  </p:childTnLst>
+                                </p:cTn>
+                              </p:par>
+                            </p:childTnLst>
+                          </p:cTn>
+                        </p:par>
+                      </p:childTnLst>
+                    </p:cTn>
+                  </p:par>
+                </p:childTnLst>
+              </p:cTn>
+              <p:prevCondLst>
+                <p:cond evt="onPrev" delay="0">
+                  <p:tgtEl>
+                    <p:sldTgt/>
+                  </p:tgtEl>
+                </p:cond>
+              </p:prevCondLst>
+              <p:nextCondLst>
+                <p:cond evt="onNext" delay="0">
+                  <p:tgtEl>
+                    <p:sldTgt/>
+                  </p:tgtEl>
+                </p:cond>
+              </p:nextCondLst>
+            </p:seq>
+          </p:childTnLst>
+        </p:cTn>
       </p:par>
     </p:tnLst>
+    <p:bldLst>
+      <p:bldP spid="3" grpId="0"/>
+    </p:bldLst>
   </p:timing>
 </p:sld>
 </file>
@@ -8388,15 +8568,7 @@
           <a:p>
             <a:r>
               <a:rPr lang="en-US" dirty="0" smtClean="0"/>
-              <a:t>How do yo</a:t>
-            </a:r>
-            <a:r>
-              <a:rPr lang="en-US" dirty="0" smtClean="0"/>
-              <a:t>u write your code to…</a:t>
-            </a:r>
-            <a:r>
-              <a:rPr lang="en-US" dirty="0" smtClean="0"/>
-              <a:t>	</a:t>
+              <a:t>How do you write your code to…	</a:t>
             </a:r>
             <a:endParaRPr lang="en-US" dirty="0"/>
           </a:p>
@@ -17947,8 +18119,13 @@
           <a:p>
             <a:r>
               <a:rPr lang="en-US" dirty="0" smtClean="0"/>
-              <a:t>Exercise</a:t>
+              <a:t>Example </a:t>
             </a:r>
+            <a:r>
+              <a:rPr lang="en-US" smtClean="0"/>
+              <a:t>&amp; exercise</a:t>
+            </a:r>
+            <a:endParaRPr lang="en-US" dirty="0" smtClean="0"/>
           </a:p>
           <a:p>
             <a:endParaRPr lang="en-US" dirty="0"/>
@@ -49495,7 +49672,6 @@
               <a:rPr lang="en-US" dirty="0" smtClean="0"/>
               <a:t>Simplify scripts</a:t>
             </a:r>
-            <a:endParaRPr lang="en-US" dirty="0" smtClean="0"/>
           </a:p>
           <a:p>
             <a:r>
@@ -51133,7 +51309,6 @@
               <a:rPr lang="en-US" dirty="0" smtClean="0"/>
               <a:t>Picking the proper tool </a:t>
             </a:r>
-            <a:endParaRPr lang="en-US" dirty="0" smtClean="0"/>
           </a:p>
           <a:p>
             <a:pPr lvl="1"/>
@@ -51151,7 +51326,6 @@
               <a:rPr lang="en-US" dirty="0" smtClean="0"/>
               <a:t>Code Architecture</a:t>
             </a:r>
-            <a:endParaRPr lang="en-US" dirty="0" smtClean="0"/>
           </a:p>
           <a:p>
             <a:pPr lvl="1"/>
@@ -51163,44 +51337,15 @@
               <a:rPr lang="en-US" dirty="0" smtClean="0"/>
               <a:t>structure</a:t>
             </a:r>
-          </a:p>
-          <a:p>
-            <a:pPr marL="457200" lvl="1" indent="0">
-              <a:buNone/>
-            </a:pPr>
-            <a:r>
-              <a:rPr lang="en-US" dirty="0" smtClean="0"/>
-              <a:t> </a:t>
-            </a:r>
-          </a:p>
-          <a:p>
-            <a:r>
-              <a:rPr lang="en-US" dirty="0" smtClean="0"/>
-              <a:t>Thank </a:t>
-            </a:r>
-            <a:r>
-              <a:rPr lang="en-US" dirty="0" smtClean="0"/>
-              <a:t>you! Questions? </a:t>
-            </a:r>
             <a:endParaRPr lang="en-US" dirty="0"/>
           </a:p>
           <a:p>
-            <a:pPr marL="0" indent="0">
-              <a:buNone/>
-            </a:pPr>
+            <a:pPr lvl="1"/>
             <a:r>
               <a:rPr lang="en-US" dirty="0" smtClean="0"/>
-              <a:t>Amelia Bertozzi-Villa </a:t>
-            </a:r>
-            <a:r>
-              <a:rPr lang="en-US" smtClean="0"/>
-              <a:t>: abertozz@uw.edu</a:t>
+              <a:t>Fundamentals of parallelization</a:t>
             </a:r>
             <a:endParaRPr lang="en-US" dirty="0" smtClean="0"/>
-          </a:p>
-          <a:p>
-            <a:pPr lvl="1"/>
-            <a:endParaRPr lang="en-US" dirty="0"/>
           </a:p>
         </p:txBody>
       </p:sp>
@@ -51516,86 +51661,161 @@
                       </p:childTnLst>
                     </p:cTn>
                   </p:par>
+                </p:childTnLst>
+              </p:cTn>
+              <p:prevCondLst>
+                <p:cond evt="onPrev" delay="0">
+                  <p:tgtEl>
+                    <p:sldTgt/>
+                  </p:tgtEl>
+                </p:cond>
+              </p:prevCondLst>
+              <p:nextCondLst>
+                <p:cond evt="onNext" delay="0">
+                  <p:tgtEl>
+                    <p:sldTgt/>
+                  </p:tgtEl>
+                </p:cond>
+              </p:nextCondLst>
+            </p:seq>
+          </p:childTnLst>
+        </p:cTn>
+      </p:par>
+    </p:tnLst>
+  </p:timing>
+</p:sld>
+</file>
+
+<file path=ppt/slides/slide28.xml><?xml version="1.0" encoding="utf-8"?>
+<p:sld xmlns:a="http://schemas.openxmlformats.org/drawingml/2006/main" xmlns:r="http://schemas.openxmlformats.org/officeDocument/2006/relationships" xmlns:p="http://schemas.openxmlformats.org/presentationml/2006/main">
+  <p:cSld>
+    <p:spTree>
+      <p:nvGrpSpPr>
+        <p:cNvPr id="1" name=""/>
+        <p:cNvGrpSpPr/>
+        <p:nvPr/>
+      </p:nvGrpSpPr>
+      <p:grpSpPr>
+        <a:xfrm>
+          <a:off x="0" y="0"/>
+          <a:ext cx="0" cy="0"/>
+          <a:chOff x="0" y="0"/>
+          <a:chExt cx="0" cy="0"/>
+        </a:xfrm>
+      </p:grpSpPr>
+      <p:sp>
+        <p:nvSpPr>
+          <p:cNvPr id="3" name="Title 2"/>
+          <p:cNvSpPr>
+            <a:spLocks noGrp="1"/>
+          </p:cNvSpPr>
+          <p:nvPr>
+            <p:ph type="title"/>
+          </p:nvPr>
+        </p:nvSpPr>
+        <p:spPr>
+          <a:xfrm>
+            <a:off x="894471" y="1688123"/>
+            <a:ext cx="10515600" cy="1139483"/>
+          </a:xfrm>
+        </p:spPr>
+        <p:txBody>
+          <a:bodyPr>
+            <a:normAutofit fontScale="90000"/>
+          </a:bodyPr>
+          <a:lstStyle/>
+          <a:p>
+            <a:pPr algn="ctr"/>
+            <a:r>
+              <a:rPr lang="en-US" dirty="0" smtClean="0"/>
+              <a:t>Amelia Bertozzi-Villa : abertozz@uw.edu</a:t>
+            </a:r>
+            <a:br>
+              <a:rPr lang="en-US" dirty="0" smtClean="0"/>
+            </a:br>
+            <a:endParaRPr lang="en-US" dirty="0"/>
+          </a:p>
+        </p:txBody>
+      </p:sp>
+      <p:sp>
+        <p:nvSpPr>
+          <p:cNvPr id="6" name="TextBox 5"/>
+          <p:cNvSpPr txBox="1"/>
+          <p:nvPr/>
+        </p:nvSpPr>
+        <p:spPr>
+          <a:xfrm>
+            <a:off x="3500511" y="3502856"/>
+            <a:ext cx="5303520" cy="707886"/>
+          </a:xfrm>
+          <a:prstGeom prst="rect">
+            <a:avLst/>
+          </a:prstGeom>
+          <a:noFill/>
+        </p:spPr>
+        <p:txBody>
+          <a:bodyPr wrap="square" rtlCol="0">
+            <a:spAutoFit/>
+          </a:bodyPr>
+          <a:lstStyle/>
+          <a:p>
+            <a:r>
+              <a:rPr lang="en-US" sz="4000" dirty="0" smtClean="0">
+                <a:latin typeface="+mj-lt"/>
+              </a:rPr>
+              <a:t>Thank you! Questions?</a:t>
+            </a:r>
+            <a:endParaRPr lang="en-US" sz="4000" dirty="0">
+              <a:latin typeface="+mj-lt"/>
+            </a:endParaRPr>
+          </a:p>
+        </p:txBody>
+      </p:sp>
+    </p:spTree>
+    <p:extLst>
+      <p:ext uri="{BB962C8B-B14F-4D97-AF65-F5344CB8AC3E}">
+        <p14:creationId xmlns:p14="http://schemas.microsoft.com/office/powerpoint/2010/main" val="2848994387"/>
+      </p:ext>
+    </p:extLst>
+  </p:cSld>
+  <p:clrMapOvr>
+    <a:masterClrMapping/>
+  </p:clrMapOvr>
+  <p:timing>
+    <p:tnLst>
+      <p:par>
+        <p:cTn id="1" dur="indefinite" restart="never" nodeType="tmRoot">
+          <p:childTnLst>
+            <p:seq concurrent="1" nextAc="seek">
+              <p:cTn id="2" dur="indefinite" nodeType="mainSeq">
+                <p:childTnLst>
                   <p:par>
-                    <p:cTn id="27" fill="hold">
+                    <p:cTn id="3" fill="hold">
                       <p:stCondLst>
                         <p:cond delay="indefinite"/>
                       </p:stCondLst>
                       <p:childTnLst>
                         <p:par>
-                          <p:cTn id="28" fill="hold">
+                          <p:cTn id="4" fill="hold">
                             <p:stCondLst>
                               <p:cond delay="0"/>
                             </p:stCondLst>
                             <p:childTnLst>
                               <p:par>
-                                <p:cTn id="29" presetID="1" presetClass="entr" presetSubtype="0" fill="hold" nodeType="clickEffect">
+                                <p:cTn id="5" presetID="1" presetClass="entr" presetSubtype="0" fill="hold" grpId="0" nodeType="clickEffect">
                                   <p:stCondLst>
                                     <p:cond delay="0"/>
                                   </p:stCondLst>
                                   <p:childTnLst>
                                     <p:set>
                                       <p:cBhvr>
-                                        <p:cTn id="30" dur="1" fill="hold">
+                                        <p:cTn id="6" dur="1" fill="hold">
                                           <p:stCondLst>
                                             <p:cond delay="0"/>
                                           </p:stCondLst>
                                         </p:cTn>
                                         <p:tgtEl>
-                                          <p:spTgt spid="3">
-                                            <p:txEl>
-                                              <p:pRg st="7" end="7"/>
-                                            </p:txEl>
-                                          </p:spTgt>
-                                        </p:tgtEl>
-                                        <p:attrNameLst>
-                                          <p:attrName>style.visibility</p:attrName>
-                                        </p:attrNameLst>
-                                      </p:cBhvr>
-                                      <p:to>
-                                        <p:strVal val="visible"/>
-                                      </p:to>
-                                    </p:set>
-                                  </p:childTnLst>
-                                </p:cTn>
-                              </p:par>
-                            </p:childTnLst>
-                          </p:cTn>
-                        </p:par>
-                      </p:childTnLst>
-                    </p:cTn>
-                  </p:par>
-                  <p:par>
-                    <p:cTn id="31" fill="hold">
-                      <p:stCondLst>
-                        <p:cond delay="indefinite"/>
-                      </p:stCondLst>
-                      <p:childTnLst>
-                        <p:par>
-                          <p:cTn id="32" fill="hold">
-                            <p:stCondLst>
-                              <p:cond delay="0"/>
-                            </p:stCondLst>
-                            <p:childTnLst>
-                              <p:par>
-                                <p:cTn id="33" presetID="1" presetClass="entr" presetSubtype="0" fill="hold" nodeType="clickEffect">
-                                  <p:stCondLst>
-                                    <p:cond delay="0"/>
-                                  </p:stCondLst>
-                                  <p:childTnLst>
-                                    <p:set>
-                                      <p:cBhvr>
-                                        <p:cTn id="34" dur="1" fill="hold">
-                                          <p:stCondLst>
-                                            <p:cond delay="0"/>
-                                          </p:stCondLst>
-                                        </p:cTn>
-                                        <p:tgtEl>
-                                          <p:spTgt spid="3">
-                                            <p:txEl>
-                                              <p:pRg st="8" end="8"/>
-                                            </p:txEl>
-                                          </p:spTgt>
+                                          <p:spTgt spid="6"/>
                                         </p:tgtEl>
                                         <p:attrNameLst>
                                           <p:attrName>style.visibility</p:attrName>
@@ -51635,6 +51855,9 @@
         </p:cTn>
       </p:par>
     </p:tnLst>
+    <p:bldLst>
+      <p:bldP spid="6" grpId="0"/>
+    </p:bldLst>
   </p:timing>
 </p:sld>
 </file>

</xml_diff>

<commit_message>
Update powerpoint, add betterpseudocode to run_all_raking
</commit_message>
<xml_diff>
--- a/class_3_4.pptx
+++ b/class_3_4.pptx
@@ -143,7 +143,7 @@
 </file>
 
 <file path=ppt/charts/chart1.xml><?xml version="1.0" encoding="utf-8"?>
-<c:chartSpace xmlns:c="http://schemas.openxmlformats.org/drawingml/2006/chart" xmlns:a="http://schemas.openxmlformats.org/drawingml/2006/main" xmlns:r="http://schemas.openxmlformats.org/officeDocument/2006/relationships">
+<c:chartSpace xmlns:c="http://schemas.openxmlformats.org/drawingml/2006/chart" xmlns:a="http://schemas.openxmlformats.org/drawingml/2006/main" xmlns:r="http://schemas.openxmlformats.org/officeDocument/2006/relationships" xmlns:c16r2="http://schemas.microsoft.com/office/drawing/2015/06/chart">
   <c:date1904 val="0"/>
   <c:lang val="en-US"/>
   <c:roundedCorners val="0"/>
@@ -310,6 +310,11 @@
             </c:numRef>
           </c:yVal>
           <c:smooth val="0"/>
+          <c:extLst>
+            <c:ext xmlns:c16="http://schemas.microsoft.com/office/drawing/2014/chart" uri="{C3380CC4-5D6E-409C-BE32-E72D297353CC}">
+              <c16:uniqueId val="{00000000-2E2B-401D-815B-81D70B596711}"/>
+            </c:ext>
+          </c:extLst>
         </c:ser>
         <c:ser>
           <c:idx val="1"/>
@@ -428,6 +433,11 @@
             </c:numRef>
           </c:yVal>
           <c:smooth val="0"/>
+          <c:extLst>
+            <c:ext xmlns:c16="http://schemas.microsoft.com/office/drawing/2014/chart" uri="{C3380CC4-5D6E-409C-BE32-E72D297353CC}">
+              <c16:uniqueId val="{00000001-2E2B-401D-815B-81D70B596711}"/>
+            </c:ext>
+          </c:extLst>
         </c:ser>
         <c:ser>
           <c:idx val="2"/>
@@ -546,6 +556,11 @@
             </c:numRef>
           </c:yVal>
           <c:smooth val="0"/>
+          <c:extLst>
+            <c:ext xmlns:c16="http://schemas.microsoft.com/office/drawing/2014/chart" uri="{C3380CC4-5D6E-409C-BE32-E72D297353CC}">
+              <c16:uniqueId val="{00000002-2E2B-401D-815B-81D70B596711}"/>
+            </c:ext>
+          </c:extLst>
         </c:ser>
         <c:ser>
           <c:idx val="3"/>
@@ -664,6 +679,11 @@
             </c:numRef>
           </c:yVal>
           <c:smooth val="0"/>
+          <c:extLst>
+            <c:ext xmlns:c16="http://schemas.microsoft.com/office/drawing/2014/chart" uri="{C3380CC4-5D6E-409C-BE32-E72D297353CC}">
+              <c16:uniqueId val="{00000003-2E2B-401D-815B-81D70B596711}"/>
+            </c:ext>
+          </c:extLst>
         </c:ser>
         <c:ser>
           <c:idx val="4"/>
@@ -782,6 +802,11 @@
             </c:numRef>
           </c:yVal>
           <c:smooth val="0"/>
+          <c:extLst>
+            <c:ext xmlns:c16="http://schemas.microsoft.com/office/drawing/2014/chart" uri="{C3380CC4-5D6E-409C-BE32-E72D297353CC}">
+              <c16:uniqueId val="{00000004-2E2B-401D-815B-81D70B596711}"/>
+            </c:ext>
+          </c:extLst>
         </c:ser>
         <c:ser>
           <c:idx val="5"/>
@@ -900,6 +925,11 @@
             </c:numRef>
           </c:yVal>
           <c:smooth val="0"/>
+          <c:extLst>
+            <c:ext xmlns:c16="http://schemas.microsoft.com/office/drawing/2014/chart" uri="{C3380CC4-5D6E-409C-BE32-E72D297353CC}">
+              <c16:uniqueId val="{00000005-2E2B-401D-815B-81D70B596711}"/>
+            </c:ext>
+          </c:extLst>
         </c:ser>
         <c:dLbls>
           <c:showLegendKey val="0"/>
@@ -1741,7 +1771,7 @@
           <a:p>
             <a:fld id="{D321804F-8474-4B3C-BEC9-4B8B6CCBA09E}" type="datetimeFigureOut">
               <a:rPr lang="en-US" smtClean="0"/>
-              <a:t>3/4/2016</a:t>
+              <a:t>11/17/2016</a:t>
             </a:fld>
             <a:endParaRPr lang="en-US"/>
           </a:p>
@@ -2089,100 +2119,6 @@
               <a:rPr lang="en-US" baseline="0" dirty="0" smtClean="0"/>
               <a:t>--mortality: how to address it</a:t>
             </a:r>
-          </a:p>
-          <a:p>
-            <a:endParaRPr lang="en-US" baseline="0" dirty="0" smtClean="0"/>
-          </a:p>
-          <a:p>
-            <a:r>
-              <a:rPr lang="en-US" baseline="0" dirty="0" smtClean="0"/>
-              <a:t>Projects:</a:t>
-            </a:r>
-          </a:p>
-          <a:p>
-            <a:r>
-              <a:rPr lang="en-US" sz="1200" kern="1200" dirty="0" smtClean="0">
-                <a:solidFill>
-                  <a:schemeClr val="tx1"/>
-                </a:solidFill>
-                <a:effectLst/>
-                <a:latin typeface="+mn-lt"/>
-                <a:ea typeface="+mn-ea"/>
-                <a:cs typeface="+mn-cs"/>
-              </a:rPr>
-              <a:t>What is the research question? </a:t>
-            </a:r>
-          </a:p>
-          <a:p>
-            <a:r>
-              <a:rPr lang="en-US" sz="1200" kern="1200" dirty="0" smtClean="0">
-                <a:solidFill>
-                  <a:schemeClr val="tx1"/>
-                </a:solidFill>
-                <a:effectLst/>
-                <a:latin typeface="+mn-lt"/>
-                <a:ea typeface="+mn-ea"/>
-                <a:cs typeface="+mn-cs"/>
-              </a:rPr>
-              <a:t> Why is the research important?  </a:t>
-            </a:r>
-          </a:p>
-          <a:p>
-            <a:r>
-              <a:rPr lang="en-US" sz="1200" kern="1200" dirty="0" smtClean="0">
-                <a:solidFill>
-                  <a:schemeClr val="tx1"/>
-                </a:solidFill>
-                <a:effectLst/>
-                <a:latin typeface="+mn-lt"/>
-                <a:ea typeface="+mn-ea"/>
-                <a:cs typeface="+mn-cs"/>
-              </a:rPr>
-              <a:t>Who is asking the research question?</a:t>
-            </a:r>
-          </a:p>
-          <a:p>
-            <a:r>
-              <a:rPr lang="en-US" sz="1200" kern="1200" dirty="0" smtClean="0">
-                <a:solidFill>
-                  <a:schemeClr val="tx1"/>
-                </a:solidFill>
-                <a:effectLst/>
-                <a:latin typeface="+mn-lt"/>
-                <a:ea typeface="+mn-ea"/>
-                <a:cs typeface="+mn-cs"/>
-              </a:rPr>
-              <a:t> Where did the data come from?  </a:t>
-            </a:r>
-          </a:p>
-          <a:p>
-            <a:r>
-              <a:rPr lang="en-US" sz="1200" kern="1200" dirty="0" smtClean="0">
-                <a:solidFill>
-                  <a:schemeClr val="tx1"/>
-                </a:solidFill>
-                <a:effectLst/>
-                <a:latin typeface="+mn-lt"/>
-                <a:ea typeface="+mn-ea"/>
-                <a:cs typeface="+mn-cs"/>
-              </a:rPr>
-              <a:t>How was the data collected?  </a:t>
-            </a:r>
-          </a:p>
-          <a:p>
-            <a:r>
-              <a:rPr lang="en-US" sz="1200" kern="1200" dirty="0" smtClean="0">
-                <a:solidFill>
-                  <a:schemeClr val="tx1"/>
-                </a:solidFill>
-                <a:effectLst/>
-                <a:latin typeface="+mn-lt"/>
-                <a:ea typeface="+mn-ea"/>
-                <a:cs typeface="+mn-cs"/>
-              </a:rPr>
-              <a:t>What did you have to do with the data?</a:t>
-            </a:r>
-            <a:endParaRPr lang="en-US" baseline="0" dirty="0" smtClean="0"/>
           </a:p>
           <a:p>
             <a:endParaRPr lang="en-US" baseline="0" dirty="0" smtClean="0"/>
@@ -4130,7 +4066,7 @@
           <a:p>
             <a:fld id="{A5C42B43-71C5-4126-819D-B934AB90E139}" type="datetimeFigureOut">
               <a:rPr lang="en-US" smtClean="0"/>
-              <a:t>3/4/2016</a:t>
+              <a:t>11/17/2016</a:t>
             </a:fld>
             <a:endParaRPr lang="en-US"/>
           </a:p>
@@ -4300,7 +4236,7 @@
           <a:p>
             <a:fld id="{A5C42B43-71C5-4126-819D-B934AB90E139}" type="datetimeFigureOut">
               <a:rPr lang="en-US" smtClean="0"/>
-              <a:t>3/4/2016</a:t>
+              <a:t>11/17/2016</a:t>
             </a:fld>
             <a:endParaRPr lang="en-US"/>
           </a:p>
@@ -4480,7 +4416,7 @@
           <a:p>
             <a:fld id="{A5C42B43-71C5-4126-819D-B934AB90E139}" type="datetimeFigureOut">
               <a:rPr lang="en-US" smtClean="0"/>
-              <a:t>3/4/2016</a:t>
+              <a:t>11/17/2016</a:t>
             </a:fld>
             <a:endParaRPr lang="en-US"/>
           </a:p>
@@ -4650,7 +4586,7 @@
           <a:p>
             <a:fld id="{A5C42B43-71C5-4126-819D-B934AB90E139}" type="datetimeFigureOut">
               <a:rPr lang="en-US" smtClean="0"/>
-              <a:t>3/4/2016</a:t>
+              <a:t>11/17/2016</a:t>
             </a:fld>
             <a:endParaRPr lang="en-US"/>
           </a:p>
@@ -4896,7 +4832,7 @@
           <a:p>
             <a:fld id="{A5C42B43-71C5-4126-819D-B934AB90E139}" type="datetimeFigureOut">
               <a:rPr lang="en-US" smtClean="0"/>
-              <a:t>3/4/2016</a:t>
+              <a:t>11/17/2016</a:t>
             </a:fld>
             <a:endParaRPr lang="en-US"/>
           </a:p>
@@ -5128,7 +5064,7 @@
           <a:p>
             <a:fld id="{A5C42B43-71C5-4126-819D-B934AB90E139}" type="datetimeFigureOut">
               <a:rPr lang="en-US" smtClean="0"/>
-              <a:t>3/4/2016</a:t>
+              <a:t>11/17/2016</a:t>
             </a:fld>
             <a:endParaRPr lang="en-US"/>
           </a:p>
@@ -5495,7 +5431,7 @@
           <a:p>
             <a:fld id="{A5C42B43-71C5-4126-819D-B934AB90E139}" type="datetimeFigureOut">
               <a:rPr lang="en-US" smtClean="0"/>
-              <a:t>3/4/2016</a:t>
+              <a:t>11/17/2016</a:t>
             </a:fld>
             <a:endParaRPr lang="en-US"/>
           </a:p>
@@ -5613,7 +5549,7 @@
           <a:p>
             <a:fld id="{A5C42B43-71C5-4126-819D-B934AB90E139}" type="datetimeFigureOut">
               <a:rPr lang="en-US" smtClean="0"/>
-              <a:t>3/4/2016</a:t>
+              <a:t>11/17/2016</a:t>
             </a:fld>
             <a:endParaRPr lang="en-US"/>
           </a:p>
@@ -5708,7 +5644,7 @@
           <a:p>
             <a:fld id="{A5C42B43-71C5-4126-819D-B934AB90E139}" type="datetimeFigureOut">
               <a:rPr lang="en-US" smtClean="0"/>
-              <a:t>3/4/2016</a:t>
+              <a:t>11/17/2016</a:t>
             </a:fld>
             <a:endParaRPr lang="en-US"/>
           </a:p>
@@ -5985,7 +5921,7 @@
           <a:p>
             <a:fld id="{A5C42B43-71C5-4126-819D-B934AB90E139}" type="datetimeFigureOut">
               <a:rPr lang="en-US" smtClean="0"/>
-              <a:t>3/4/2016</a:t>
+              <a:t>11/17/2016</a:t>
             </a:fld>
             <a:endParaRPr lang="en-US"/>
           </a:p>
@@ -6238,7 +6174,7 @@
           <a:p>
             <a:fld id="{A5C42B43-71C5-4126-819D-B934AB90E139}" type="datetimeFigureOut">
               <a:rPr lang="en-US" smtClean="0"/>
-              <a:t>3/4/2016</a:t>
+              <a:t>11/17/2016</a:t>
             </a:fld>
             <a:endParaRPr lang="en-US"/>
           </a:p>
@@ -6451,7 +6387,7 @@
           <a:p>
             <a:fld id="{A5C42B43-71C5-4126-819D-B934AB90E139}" type="datetimeFigureOut">
               <a:rPr lang="en-US" smtClean="0"/>
-              <a:t>3/4/2016</a:t>
+              <a:t>11/17/2016</a:t>
             </a:fld>
             <a:endParaRPr lang="en-US"/>
           </a:p>
@@ -6856,6 +6792,47 @@
           <a:chExt cx="0" cy="0"/>
         </a:xfrm>
       </p:grpSpPr>
+      <p:pic>
+        <p:nvPicPr>
+          <p:cNvPr id="5" name="Picture 2" descr="http://www.heroza.org/wp-content/uploads/2015/05/IDM.png"/>
+          <p:cNvPicPr>
+            <a:picLocks noChangeAspect="1" noChangeArrowheads="1"/>
+          </p:cNvPicPr>
+          <p:nvPr/>
+        </p:nvPicPr>
+        <p:blipFill>
+          <a:blip r:embed="rId3">
+            <a:extLst>
+              <a:ext uri="{28A0092B-C50C-407E-A947-70E740481C1C}">
+                <a14:useLocalDpi xmlns:a14="http://schemas.microsoft.com/office/drawing/2010/main" val="0"/>
+              </a:ext>
+            </a:extLst>
+          </a:blip>
+          <a:srcRect/>
+          <a:stretch>
+            <a:fillRect/>
+          </a:stretch>
+        </p:blipFill>
+        <p:spPr bwMode="auto">
+          <a:xfrm>
+            <a:off x="436418" y="262662"/>
+            <a:ext cx="3541491" cy="3541491"/>
+          </a:xfrm>
+          <a:prstGeom prst="rect">
+            <a:avLst/>
+          </a:prstGeom>
+          <a:noFill/>
+          <a:extLst>
+            <a:ext uri="{909E8E84-426E-40DD-AFC4-6F175D3DCCD1}">
+              <a14:hiddenFill xmlns:a14="http://schemas.microsoft.com/office/drawing/2010/main">
+                <a:solidFill>
+                  <a:srgbClr val="FFFFFF"/>
+                </a:solidFill>
+              </a14:hiddenFill>
+            </a:ext>
+          </a:extLst>
+        </p:spPr>
+      </p:pic>
       <p:sp>
         <p:nvSpPr>
           <p:cNvPr id="4" name="Title 3"/>
@@ -6888,7 +6865,7 @@
           <p:nvPr/>
         </p:nvPicPr>
         <p:blipFill>
-          <a:blip r:embed="rId3">
+          <a:blip r:embed="rId4">
             <a:extLst>
               <a:ext uri="{28A0092B-C50C-407E-A947-70E740481C1C}">
                 <a14:useLocalDpi xmlns:a14="http://schemas.microsoft.com/office/drawing/2010/main" val="0"/>
@@ -6902,8 +6879,8 @@
         </p:blipFill>
         <p:spPr bwMode="auto">
           <a:xfrm>
-            <a:off x="838200" y="1950721"/>
-            <a:ext cx="3530061" cy="1125728"/>
+            <a:off x="8174182" y="412603"/>
+            <a:ext cx="2403764" cy="766555"/>
           </a:xfrm>
           <a:prstGeom prst="rect">
             <a:avLst/>
@@ -6929,15 +6906,15 @@
           <p:nvPr/>
         </p:nvPicPr>
         <p:blipFill>
-          <a:blip r:embed="rId4"/>
+          <a:blip r:embed="rId5"/>
           <a:stretch>
             <a:fillRect/>
           </a:stretch>
         </p:blipFill>
         <p:spPr>
           <a:xfrm>
-            <a:off x="6339840" y="746964"/>
-            <a:ext cx="4864608" cy="3533242"/>
+            <a:off x="8848501" y="1430961"/>
+            <a:ext cx="3031772" cy="2202024"/>
           </a:xfrm>
           <a:prstGeom prst="rect">
             <a:avLst/>
@@ -6953,15 +6930,69 @@
           <p:nvPr/>
         </p:nvPicPr>
         <p:blipFill>
-          <a:blip r:embed="rId5"/>
+          <a:blip r:embed="rId6"/>
           <a:stretch>
             <a:fillRect/>
           </a:stretch>
         </p:blipFill>
         <p:spPr>
           <a:xfrm>
-            <a:off x="3386860" y="3580218"/>
+            <a:off x="7709851" y="3804153"/>
             <a:ext cx="2419048" cy="2428571"/>
+          </a:xfrm>
+          <a:prstGeom prst="rect">
+            <a:avLst/>
+          </a:prstGeom>
+        </p:spPr>
+      </p:pic>
+      <p:pic>
+        <p:nvPicPr>
+          <p:cNvPr id="6" name="Picture 5"/>
+          <p:cNvPicPr>
+            <a:picLocks noChangeAspect="1"/>
+          </p:cNvPicPr>
+          <p:nvPr/>
+        </p:nvPicPr>
+        <p:blipFill>
+          <a:blip r:embed="rId7"/>
+          <a:stretch>
+            <a:fillRect/>
+          </a:stretch>
+        </p:blipFill>
+        <p:spPr>
+          <a:xfrm>
+            <a:off x="4240784" y="2865985"/>
+            <a:ext cx="2581275" cy="3743325"/>
+          </a:xfrm>
+          <a:prstGeom prst="rect">
+            <a:avLst/>
+          </a:prstGeom>
+        </p:spPr>
+      </p:pic>
+      <p:pic>
+        <p:nvPicPr>
+          <p:cNvPr id="7" name="Picture 6"/>
+          <p:cNvPicPr>
+            <a:picLocks noChangeAspect="1"/>
+          </p:cNvPicPr>
+          <p:nvPr/>
+        </p:nvPicPr>
+        <p:blipFill>
+          <a:blip r:embed="rId8">
+            <a:extLst>
+              <a:ext uri="{28A0092B-C50C-407E-A947-70E740481C1C}">
+                <a14:useLocalDpi xmlns:a14="http://schemas.microsoft.com/office/drawing/2010/main" val="0"/>
+              </a:ext>
+            </a:extLst>
+          </a:blip>
+          <a:stretch>
+            <a:fillRect/>
+          </a:stretch>
+        </p:blipFill>
+        <p:spPr>
+          <a:xfrm>
+            <a:off x="-14105" y="2741640"/>
+            <a:ext cx="3992014" cy="3992014"/>
           </a:xfrm>
           <a:prstGeom prst="rect">
             <a:avLst/>
@@ -7057,7 +7088,7 @@
                                           </p:stCondLst>
                                         </p:cTn>
                                         <p:tgtEl>
-                                          <p:spTgt spid="1026"/>
+                                          <p:spTgt spid="5"/>
                                         </p:tgtEl>
                                         <p:attrNameLst>
                                           <p:attrName>style.visibility</p:attrName>
@@ -7102,7 +7133,7 @@
                                           </p:stCondLst>
                                         </p:cTn>
                                         <p:tgtEl>
-                                          <p:spTgt spid="2"/>
+                                          <p:spTgt spid="7"/>
                                         </p:tgtEl>
                                         <p:attrNameLst>
                                           <p:attrName>style.visibility</p:attrName>
@@ -7142,6 +7173,141 @@
                                     <p:set>
                                       <p:cBhvr>
                                         <p:cTn id="18" dur="1" fill="hold">
+                                          <p:stCondLst>
+                                            <p:cond delay="0"/>
+                                          </p:stCondLst>
+                                        </p:cTn>
+                                        <p:tgtEl>
+                                          <p:spTgt spid="6"/>
+                                        </p:tgtEl>
+                                        <p:attrNameLst>
+                                          <p:attrName>style.visibility</p:attrName>
+                                        </p:attrNameLst>
+                                      </p:cBhvr>
+                                      <p:to>
+                                        <p:strVal val="visible"/>
+                                      </p:to>
+                                    </p:set>
+                                  </p:childTnLst>
+                                </p:cTn>
+                              </p:par>
+                            </p:childTnLst>
+                          </p:cTn>
+                        </p:par>
+                      </p:childTnLst>
+                    </p:cTn>
+                  </p:par>
+                  <p:par>
+                    <p:cTn id="19" fill="hold">
+                      <p:stCondLst>
+                        <p:cond delay="indefinite"/>
+                      </p:stCondLst>
+                      <p:childTnLst>
+                        <p:par>
+                          <p:cTn id="20" fill="hold">
+                            <p:stCondLst>
+                              <p:cond delay="0"/>
+                            </p:stCondLst>
+                            <p:childTnLst>
+                              <p:par>
+                                <p:cTn id="21" presetID="1" presetClass="entr" presetSubtype="0" fill="hold" nodeType="clickEffect">
+                                  <p:stCondLst>
+                                    <p:cond delay="0"/>
+                                  </p:stCondLst>
+                                  <p:childTnLst>
+                                    <p:set>
+                                      <p:cBhvr>
+                                        <p:cTn id="22" dur="1" fill="hold">
+                                          <p:stCondLst>
+                                            <p:cond delay="0"/>
+                                          </p:stCondLst>
+                                        </p:cTn>
+                                        <p:tgtEl>
+                                          <p:spTgt spid="1026"/>
+                                        </p:tgtEl>
+                                        <p:attrNameLst>
+                                          <p:attrName>style.visibility</p:attrName>
+                                        </p:attrNameLst>
+                                      </p:cBhvr>
+                                      <p:to>
+                                        <p:strVal val="visible"/>
+                                      </p:to>
+                                    </p:set>
+                                  </p:childTnLst>
+                                </p:cTn>
+                              </p:par>
+                            </p:childTnLst>
+                          </p:cTn>
+                        </p:par>
+                      </p:childTnLst>
+                    </p:cTn>
+                  </p:par>
+                  <p:par>
+                    <p:cTn id="23" fill="hold">
+                      <p:stCondLst>
+                        <p:cond delay="indefinite"/>
+                      </p:stCondLst>
+                      <p:childTnLst>
+                        <p:par>
+                          <p:cTn id="24" fill="hold">
+                            <p:stCondLst>
+                              <p:cond delay="0"/>
+                            </p:stCondLst>
+                            <p:childTnLst>
+                              <p:par>
+                                <p:cTn id="25" presetID="1" presetClass="entr" presetSubtype="0" fill="hold" nodeType="clickEffect">
+                                  <p:stCondLst>
+                                    <p:cond delay="0"/>
+                                  </p:stCondLst>
+                                  <p:childTnLst>
+                                    <p:set>
+                                      <p:cBhvr>
+                                        <p:cTn id="26" dur="1" fill="hold">
+                                          <p:stCondLst>
+                                            <p:cond delay="0"/>
+                                          </p:stCondLst>
+                                        </p:cTn>
+                                        <p:tgtEl>
+                                          <p:spTgt spid="2"/>
+                                        </p:tgtEl>
+                                        <p:attrNameLst>
+                                          <p:attrName>style.visibility</p:attrName>
+                                        </p:attrNameLst>
+                                      </p:cBhvr>
+                                      <p:to>
+                                        <p:strVal val="visible"/>
+                                      </p:to>
+                                    </p:set>
+                                  </p:childTnLst>
+                                </p:cTn>
+                              </p:par>
+                            </p:childTnLst>
+                          </p:cTn>
+                        </p:par>
+                      </p:childTnLst>
+                    </p:cTn>
+                  </p:par>
+                  <p:par>
+                    <p:cTn id="27" fill="hold">
+                      <p:stCondLst>
+                        <p:cond delay="indefinite"/>
+                      </p:stCondLst>
+                      <p:childTnLst>
+                        <p:par>
+                          <p:cTn id="28" fill="hold">
+                            <p:stCondLst>
+                              <p:cond delay="0"/>
+                            </p:stCondLst>
+                            <p:childTnLst>
+                              <p:par>
+                                <p:cTn id="29" presetID="1" presetClass="entr" presetSubtype="0" fill="hold" nodeType="clickEffect">
+                                  <p:stCondLst>
+                                    <p:cond delay="0"/>
+                                  </p:stCondLst>
+                                  <p:childTnLst>
+                                    <p:set>
+                                      <p:cBhvr>
+                                        <p:cTn id="30" dur="1" fill="hold">
                                           <p:stCondLst>
                                             <p:cond delay="0"/>
                                           </p:stCondLst>
@@ -8399,15 +8565,7 @@
             </a:r>
             <a:r>
               <a:rPr lang="en-US" sz="3600" dirty="0" smtClean="0"/>
-              <a:t>is </a:t>
-            </a:r>
-            <a:r>
-              <a:rPr lang="en-US" sz="3600" dirty="0" smtClean="0"/>
-              <a:t>to </a:t>
-            </a:r>
-            <a:r>
-              <a:rPr lang="en-US" sz="3600" dirty="0" smtClean="0"/>
-              <a:t>use it. </a:t>
+              <a:t>is to use it. </a:t>
             </a:r>
             <a:endParaRPr lang="en-US" sz="3600" dirty="0"/>
           </a:p>
@@ -51331,11 +51489,7 @@
             <a:pPr lvl="1"/>
             <a:r>
               <a:rPr lang="en-US" dirty="0" smtClean="0"/>
-              <a:t>Picking the proper code </a:t>
-            </a:r>
-            <a:r>
-              <a:rPr lang="en-US" dirty="0" smtClean="0"/>
-              <a:t>structure</a:t>
+              <a:t>Picking the proper code structure</a:t>
             </a:r>
             <a:endParaRPr lang="en-US" dirty="0"/>
           </a:p>
@@ -51345,7 +51499,6 @@
               <a:rPr lang="en-US" dirty="0" smtClean="0"/>
               <a:t>Fundamentals of parallelization</a:t>
             </a:r>
-            <a:endParaRPr lang="en-US" dirty="0" smtClean="0"/>
           </a:p>
         </p:txBody>
       </p:sp>
@@ -51728,7 +51881,28 @@
             <a:pPr algn="ctr"/>
             <a:r>
               <a:rPr lang="en-US" dirty="0" smtClean="0"/>
-              <a:t>Amelia Bertozzi-Villa : abertozz@uw.edu</a:t>
+              <a:t>Amelia Bertozzi-Villa : </a:t>
+            </a:r>
+            <a:r>
+              <a:rPr lang="en-US" dirty="0" smtClean="0">
+                <a:hlinkClick r:id="rId2"/>
+              </a:rPr>
+              <a:t>abertozz@uw.edu</a:t>
+            </a:r>
+            <a:r>
+              <a:rPr lang="en-US" dirty="0" smtClean="0"/>
+              <a:t/>
+            </a:r>
+            <a:br>
+              <a:rPr lang="en-US" dirty="0" smtClean="0"/>
+            </a:br>
+            <a:r>
+              <a:rPr lang="en-US" dirty="0" smtClean="0"/>
+              <a:t>ameliabv.com</a:t>
+            </a:r>
+            <a:r>
+              <a:rPr lang="en-US" dirty="0" smtClean="0"/>
+              <a:t/>
             </a:r>
             <a:br>
               <a:rPr lang="en-US" dirty="0" smtClean="0"/>

</xml_diff>